<commit_message>
update section 1, section 2.1
</commit_message>
<xml_diff>
--- a/figure/plot.pptx
+++ b/figure/plot.pptx
@@ -7,9 +7,11 @@
   <p:sldIdLst>
     <p:sldId id="256" r:id="rId2"/>
     <p:sldId id="257" r:id="rId3"/>
+    <p:sldId id="258" r:id="rId4"/>
+    <p:sldId id="259" r:id="rId5"/>
   </p:sldIdLst>
   <p:sldSz cx="12192000" cy="6858000"/>
-  <p:notesSz cx="6858000" cy="9144000"/>
+  <p:notesSz cx="7104063" cy="10234613"/>
   <p:defaultTextStyle>
     <a:defPPr>
       <a:defRPr lang="zh-CN"/>
@@ -105,6 +107,11 @@
       </a:defRPr>
     </a:lvl9pPr>
   </p:defaultTextStyle>
+  <p:extLst>
+    <p:ext uri="{EFAFB233-063F-42B5-8137-9DF3F51BA10A}">
+      <p15:sldGuideLst xmlns:p15="http://schemas.microsoft.com/office/powerpoint/2012/main"/>
+    </p:ext>
+  </p:extLst>
 </p:presentation>
 </file>
 
@@ -255,7 +262,7 @@
           <a:p>
             <a:fld id="{3B1C746F-F688-4348-8346-709913A1D897}" type="datetimeFigureOut">
               <a:rPr lang="zh-CN" altLang="en-US" smtClean="0"/>
-              <a:t>2023/6/28</a:t>
+              <a:t>2023/9/13</a:t>
             </a:fld>
             <a:endParaRPr lang="zh-CN" altLang="en-US"/>
           </a:p>
@@ -453,7 +460,7 @@
           <a:p>
             <a:fld id="{3B1C746F-F688-4348-8346-709913A1D897}" type="datetimeFigureOut">
               <a:rPr lang="zh-CN" altLang="en-US" smtClean="0"/>
-              <a:t>2023/6/28</a:t>
+              <a:t>2023/9/13</a:t>
             </a:fld>
             <a:endParaRPr lang="zh-CN" altLang="en-US"/>
           </a:p>
@@ -661,7 +668,7 @@
           <a:p>
             <a:fld id="{3B1C746F-F688-4348-8346-709913A1D897}" type="datetimeFigureOut">
               <a:rPr lang="zh-CN" altLang="en-US" smtClean="0"/>
-              <a:t>2023/6/28</a:t>
+              <a:t>2023/9/13</a:t>
             </a:fld>
             <a:endParaRPr lang="zh-CN" altLang="en-US"/>
           </a:p>
@@ -859,7 +866,7 @@
           <a:p>
             <a:fld id="{3B1C746F-F688-4348-8346-709913A1D897}" type="datetimeFigureOut">
               <a:rPr lang="zh-CN" altLang="en-US" smtClean="0"/>
-              <a:t>2023/6/28</a:t>
+              <a:t>2023/9/13</a:t>
             </a:fld>
             <a:endParaRPr lang="zh-CN" altLang="en-US"/>
           </a:p>
@@ -1134,7 +1141,7 @@
           <a:p>
             <a:fld id="{3B1C746F-F688-4348-8346-709913A1D897}" type="datetimeFigureOut">
               <a:rPr lang="zh-CN" altLang="en-US" smtClean="0"/>
-              <a:t>2023/6/28</a:t>
+              <a:t>2023/9/13</a:t>
             </a:fld>
             <a:endParaRPr lang="zh-CN" altLang="en-US"/>
           </a:p>
@@ -1399,7 +1406,7 @@
           <a:p>
             <a:fld id="{3B1C746F-F688-4348-8346-709913A1D897}" type="datetimeFigureOut">
               <a:rPr lang="zh-CN" altLang="en-US" smtClean="0"/>
-              <a:t>2023/6/28</a:t>
+              <a:t>2023/9/13</a:t>
             </a:fld>
             <a:endParaRPr lang="zh-CN" altLang="en-US"/>
           </a:p>
@@ -1811,7 +1818,7 @@
           <a:p>
             <a:fld id="{3B1C746F-F688-4348-8346-709913A1D897}" type="datetimeFigureOut">
               <a:rPr lang="zh-CN" altLang="en-US" smtClean="0"/>
-              <a:t>2023/6/28</a:t>
+              <a:t>2023/9/13</a:t>
             </a:fld>
             <a:endParaRPr lang="zh-CN" altLang="en-US"/>
           </a:p>
@@ -1952,7 +1959,7 @@
           <a:p>
             <a:fld id="{3B1C746F-F688-4348-8346-709913A1D897}" type="datetimeFigureOut">
               <a:rPr lang="zh-CN" altLang="en-US" smtClean="0"/>
-              <a:t>2023/6/28</a:t>
+              <a:t>2023/9/13</a:t>
             </a:fld>
             <a:endParaRPr lang="zh-CN" altLang="en-US"/>
           </a:p>
@@ -2065,7 +2072,7 @@
           <a:p>
             <a:fld id="{3B1C746F-F688-4348-8346-709913A1D897}" type="datetimeFigureOut">
               <a:rPr lang="zh-CN" altLang="en-US" smtClean="0"/>
-              <a:t>2023/6/28</a:t>
+              <a:t>2023/9/13</a:t>
             </a:fld>
             <a:endParaRPr lang="zh-CN" altLang="en-US"/>
           </a:p>
@@ -2376,7 +2383,7 @@
           <a:p>
             <a:fld id="{3B1C746F-F688-4348-8346-709913A1D897}" type="datetimeFigureOut">
               <a:rPr lang="zh-CN" altLang="en-US" smtClean="0"/>
-              <a:t>2023/6/28</a:t>
+              <a:t>2023/9/13</a:t>
             </a:fld>
             <a:endParaRPr lang="zh-CN" altLang="en-US"/>
           </a:p>
@@ -2664,7 +2671,7 @@
           <a:p>
             <a:fld id="{3B1C746F-F688-4348-8346-709913A1D897}" type="datetimeFigureOut">
               <a:rPr lang="zh-CN" altLang="en-US" smtClean="0"/>
-              <a:t>2023/6/28</a:t>
+              <a:t>2023/9/13</a:t>
             </a:fld>
             <a:endParaRPr lang="zh-CN" altLang="en-US"/>
           </a:p>
@@ -2905,7 +2912,7 @@
           <a:p>
             <a:fld id="{3B1C746F-F688-4348-8346-709913A1D897}" type="datetimeFigureOut">
               <a:rPr lang="zh-CN" altLang="en-US" smtClean="0"/>
-              <a:t>2023/6/28</a:t>
+              <a:t>2023/9/13</a:t>
             </a:fld>
             <a:endParaRPr lang="zh-CN" altLang="en-US"/>
           </a:p>
@@ -7800,6 +7807,4813 @@
 </p:sld>
 </file>
 
+<file path=ppt/slides/slide3.xml><?xml version="1.0" encoding="utf-8"?>
+<p:sld xmlns:a="http://schemas.openxmlformats.org/drawingml/2006/main" xmlns:r="http://schemas.openxmlformats.org/officeDocument/2006/relationships" xmlns:p="http://schemas.openxmlformats.org/presentationml/2006/main">
+  <p:cSld>
+    <p:spTree>
+      <p:nvGrpSpPr>
+        <p:cNvPr id="1" name=""/>
+        <p:cNvGrpSpPr/>
+        <p:nvPr/>
+      </p:nvGrpSpPr>
+      <p:grpSpPr>
+        <a:xfrm>
+          <a:off x="0" y="0"/>
+          <a:ext cx="0" cy="0"/>
+          <a:chOff x="0" y="0"/>
+          <a:chExt cx="0" cy="0"/>
+        </a:xfrm>
+      </p:grpSpPr>
+      <p:sp>
+        <p:nvSpPr>
+          <p:cNvPr id="2" name="矩形: 圆角 1">
+            <a:extLst>
+              <a:ext uri="{FF2B5EF4-FFF2-40B4-BE49-F238E27FC236}">
+                <a16:creationId xmlns:a16="http://schemas.microsoft.com/office/drawing/2014/main" id="{2DB56559-682C-47D9-9484-870A5549DA8E}"/>
+              </a:ext>
+            </a:extLst>
+          </p:cNvPr>
+          <p:cNvSpPr/>
+          <p:nvPr/>
+        </p:nvSpPr>
+        <p:spPr>
+          <a:xfrm>
+            <a:off x="6012266" y="2340000"/>
+            <a:ext cx="1080000" cy="389000"/>
+          </a:xfrm>
+          <a:prstGeom prst="roundRect">
+            <a:avLst/>
+          </a:prstGeom>
+          <a:noFill/>
+          <a:ln>
+            <a:solidFill>
+              <a:srgbClr val="B2B3B7"/>
+            </a:solidFill>
+          </a:ln>
+        </p:spPr>
+        <p:style>
+          <a:lnRef idx="2">
+            <a:schemeClr val="accent1">
+              <a:shade val="50000"/>
+            </a:schemeClr>
+          </a:lnRef>
+          <a:fillRef idx="1">
+            <a:schemeClr val="accent1"/>
+          </a:fillRef>
+          <a:effectRef idx="0">
+            <a:schemeClr val="accent1"/>
+          </a:effectRef>
+          <a:fontRef idx="minor">
+            <a:schemeClr val="lt1"/>
+          </a:fontRef>
+        </p:style>
+        <p:txBody>
+          <a:bodyPr lIns="72000" tIns="0" rIns="36000" bIns="0" rtlCol="0" anchor="ctr">
+            <a:normAutofit fontScale="92500"/>
+          </a:bodyPr>
+          <a:lstStyle/>
+          <a:p>
+            <a:r>
+              <a:rPr lang="en-US" altLang="zh-CN" sz="1200" b="1" dirty="0">
+                <a:solidFill>
+                  <a:srgbClr val="B2B3B7"/>
+                </a:solidFill>
+              </a:rPr>
+              <a:t>L: u</a:t>
+            </a:r>
+            <a:r>
+              <a:rPr lang="en-US" altLang="zh-CN" sz="1200" b="1" baseline="-25000" dirty="0">
+                <a:solidFill>
+                  <a:srgbClr val="B2B3B7"/>
+                </a:solidFill>
+              </a:rPr>
+              <a:t>1 </a:t>
+            </a:r>
+            <a:r>
+              <a:rPr lang="en-US" altLang="zh-CN" sz="1200" b="1" dirty="0">
+                <a:solidFill>
+                  <a:srgbClr val="B2B3B7"/>
+                </a:solidFill>
+              </a:rPr>
+              <a:t>u</a:t>
+            </a:r>
+            <a:r>
+              <a:rPr lang="en-US" altLang="zh-CN" sz="1200" b="1" baseline="-25000" dirty="0">
+                <a:solidFill>
+                  <a:srgbClr val="B2B3B7"/>
+                </a:solidFill>
+              </a:rPr>
+              <a:t>2 </a:t>
+            </a:r>
+            <a:r>
+              <a:rPr lang="en-US" altLang="zh-CN" sz="1200" b="1" dirty="0">
+                <a:solidFill>
+                  <a:srgbClr val="B2B3B7"/>
+                </a:solidFill>
+              </a:rPr>
+              <a:t>u</a:t>
+            </a:r>
+            <a:r>
+              <a:rPr lang="en-US" altLang="zh-CN" sz="1200" b="1" baseline="-25000" dirty="0">
+                <a:solidFill>
+                  <a:srgbClr val="B2B3B7"/>
+                </a:solidFill>
+              </a:rPr>
+              <a:t>3 </a:t>
+            </a:r>
+            <a:r>
+              <a:rPr lang="en-US" altLang="zh-CN" sz="1200" b="1" dirty="0">
+                <a:solidFill>
+                  <a:srgbClr val="B2B3B7"/>
+                </a:solidFill>
+              </a:rPr>
+              <a:t>u</a:t>
+            </a:r>
+            <a:r>
+              <a:rPr lang="en-US" altLang="zh-CN" sz="1200" b="1" baseline="-25000" dirty="0">
+                <a:solidFill>
+                  <a:srgbClr val="B2B3B7"/>
+                </a:solidFill>
+              </a:rPr>
+              <a:t>4</a:t>
+            </a:r>
+            <a:r>
+              <a:rPr lang="en-US" altLang="zh-CN" sz="1200" b="1" dirty="0">
+                <a:solidFill>
+                  <a:srgbClr val="B2B3B7"/>
+                </a:solidFill>
+              </a:rPr>
+              <a:t> u</a:t>
+            </a:r>
+            <a:r>
+              <a:rPr lang="en-US" altLang="zh-CN" sz="1200" b="1" baseline="-25000" dirty="0">
+                <a:solidFill>
+                  <a:srgbClr val="B2B3B7"/>
+                </a:solidFill>
+              </a:rPr>
+              <a:t>5</a:t>
+            </a:r>
+            <a:endParaRPr lang="zh-CN" altLang="en-US" sz="1200" b="1" dirty="0">
+              <a:solidFill>
+                <a:srgbClr val="B2B3B7"/>
+              </a:solidFill>
+            </a:endParaRPr>
+          </a:p>
+          <a:p>
+            <a:r>
+              <a:rPr lang="en-US" altLang="zh-CN" sz="1200" b="1" dirty="0">
+                <a:solidFill>
+                  <a:srgbClr val="B2B3B7"/>
+                </a:solidFill>
+              </a:rPr>
+              <a:t>R: </a:t>
+            </a:r>
+            <a:r>
+              <a:rPr lang="zh-CN" altLang="en-US" sz="1200" b="1" dirty="0">
+                <a:solidFill>
+                  <a:srgbClr val="000AFF"/>
+                </a:solidFill>
+              </a:rPr>
+              <a:t>∅</a:t>
+            </a:r>
+          </a:p>
+        </p:txBody>
+      </p:sp>
+      <p:graphicFrame>
+        <p:nvGraphicFramePr>
+          <p:cNvPr id="3" name="表格 2">
+            <a:extLst>
+              <a:ext uri="{FF2B5EF4-FFF2-40B4-BE49-F238E27FC236}">
+                <a16:creationId xmlns:a16="http://schemas.microsoft.com/office/drawing/2014/main" id="{E1AD8AE6-680D-4F57-9040-743CD1CB49B6}"/>
+              </a:ext>
+            </a:extLst>
+          </p:cNvPr>
+          <p:cNvGraphicFramePr>
+            <a:graphicFrameLocks noGrp="1"/>
+          </p:cNvGraphicFramePr>
+          <p:nvPr>
+            <p:extLst>
+              <p:ext uri="{D42A27DB-BD31-4B8C-83A1-F6EECF244321}">
+                <p14:modId xmlns:p14="http://schemas.microsoft.com/office/powerpoint/2010/main" val="4026073470"/>
+              </p:ext>
+            </p:extLst>
+          </p:nvPr>
+        </p:nvGraphicFramePr>
+        <p:xfrm>
+          <a:off x="7809812" y="2281559"/>
+          <a:ext cx="1337600" cy="640080"/>
+        </p:xfrm>
+        <a:graphic>
+          <a:graphicData uri="http://schemas.openxmlformats.org/drawingml/2006/table">
+            <a:tbl>
+              <a:tblPr firstRow="1" bandRow="1">
+                <a:tableStyleId>{5C22544A-7EE6-4342-B048-85BDC9FD1C3A}</a:tableStyleId>
+              </a:tblPr>
+              <a:tblGrid>
+                <a:gridCol w="257600">
+                  <a:extLst>
+                    <a:ext uri="{9D8B030D-6E8A-4147-A177-3AD203B41FA5}">
+                      <a16:colId xmlns:a16="http://schemas.microsoft.com/office/drawing/2014/main" val="144652855"/>
+                    </a:ext>
+                  </a:extLst>
+                </a:gridCol>
+                <a:gridCol w="1080000">
+                  <a:extLst>
+                    <a:ext uri="{9D8B030D-6E8A-4147-A177-3AD203B41FA5}">
+                      <a16:colId xmlns:a16="http://schemas.microsoft.com/office/drawing/2014/main" val="2378662973"/>
+                    </a:ext>
+                  </a:extLst>
+                </a:gridCol>
+              </a:tblGrid>
+              <a:tr h="180000">
+                <a:tc>
+                  <a:txBody>
+                    <a:bodyPr/>
+                    <a:lstStyle/>
+                    <a:p>
+                      <a:endParaRPr lang="zh-CN" altLang="en-US" sz="1400" b="0" dirty="0">
+                        <a:solidFill>
+                          <a:schemeClr val="tx1"/>
+                        </a:solidFill>
+                      </a:endParaRPr>
+                    </a:p>
+                  </a:txBody>
+                  <a:tcPr marL="72000" marR="0" marT="0" marB="0">
+                    <a:lnL w="12700" cap="flat" cmpd="sng" algn="ctr">
+                      <a:noFill/>
+                      <a:prstDash val="solid"/>
+                      <a:round/>
+                      <a:headEnd type="none" w="med" len="med"/>
+                      <a:tailEnd type="none" w="med" len="med"/>
+                    </a:lnL>
+                    <a:lnR w="12700" cap="flat" cmpd="sng" algn="ctr">
+                      <a:noFill/>
+                      <a:prstDash val="solid"/>
+                      <a:round/>
+                      <a:headEnd type="none" w="med" len="med"/>
+                      <a:tailEnd type="none" w="med" len="med"/>
+                    </a:lnR>
+                    <a:lnT w="12700" cap="flat" cmpd="sng" algn="ctr">
+                      <a:noFill/>
+                      <a:prstDash val="solid"/>
+                      <a:round/>
+                      <a:headEnd type="none" w="med" len="med"/>
+                      <a:tailEnd type="none" w="med" len="med"/>
+                    </a:lnT>
+                    <a:lnB w="12700" cap="flat" cmpd="sng" algn="ctr">
+                      <a:noFill/>
+                      <a:prstDash val="solid"/>
+                      <a:round/>
+                      <a:headEnd type="none" w="med" len="med"/>
+                      <a:tailEnd type="none" w="med" len="med"/>
+                    </a:lnB>
+                    <a:lnTlToBr w="12700" cmpd="sng">
+                      <a:noFill/>
+                      <a:prstDash val="solid"/>
+                    </a:lnTlToBr>
+                    <a:lnBlToTr w="12700" cmpd="sng">
+                      <a:noFill/>
+                      <a:prstDash val="solid"/>
+                    </a:lnBlToTr>
+                    <a:solidFill>
+                      <a:schemeClr val="bg1"/>
+                    </a:solidFill>
+                  </a:tcPr>
+                </a:tc>
+                <a:tc>
+                  <a:txBody>
+                    <a:bodyPr/>
+                    <a:lstStyle/>
+                    <a:p>
+                      <a:r>
+                        <a:rPr lang="zh-CN" altLang="en-US" sz="1200" b="0" dirty="0">
+                          <a:solidFill>
+                            <a:schemeClr val="tx1"/>
+                          </a:solidFill>
+                        </a:rPr>
+                        <a:t>根节点</a:t>
+                      </a:r>
+                    </a:p>
+                  </a:txBody>
+                  <a:tcPr marL="72000" marR="0" marT="0" marB="0">
+                    <a:lnL w="12700" cap="flat" cmpd="sng" algn="ctr">
+                      <a:noFill/>
+                      <a:prstDash val="solid"/>
+                      <a:round/>
+                      <a:headEnd type="none" w="med" len="med"/>
+                      <a:tailEnd type="none" w="med" len="med"/>
+                    </a:lnL>
+                    <a:lnR w="12700" cap="flat" cmpd="sng" algn="ctr">
+                      <a:noFill/>
+                      <a:prstDash val="solid"/>
+                      <a:round/>
+                      <a:headEnd type="none" w="med" len="med"/>
+                      <a:tailEnd type="none" w="med" len="med"/>
+                    </a:lnR>
+                    <a:lnT w="12700" cap="flat" cmpd="sng" algn="ctr">
+                      <a:noFill/>
+                      <a:prstDash val="solid"/>
+                      <a:round/>
+                      <a:headEnd type="none" w="med" len="med"/>
+                      <a:tailEnd type="none" w="med" len="med"/>
+                    </a:lnT>
+                    <a:lnB w="12700" cap="flat" cmpd="sng" algn="ctr">
+                      <a:noFill/>
+                      <a:prstDash val="solid"/>
+                      <a:round/>
+                      <a:headEnd type="none" w="med" len="med"/>
+                      <a:tailEnd type="none" w="med" len="med"/>
+                    </a:lnB>
+                    <a:lnTlToBr w="12700" cmpd="sng">
+                      <a:noFill/>
+                      <a:prstDash val="solid"/>
+                    </a:lnTlToBr>
+                    <a:lnBlToTr w="12700" cmpd="sng">
+                      <a:noFill/>
+                      <a:prstDash val="solid"/>
+                    </a:lnBlToTr>
+                    <a:solidFill>
+                      <a:schemeClr val="bg1"/>
+                    </a:solidFill>
+                  </a:tcPr>
+                </a:tc>
+                <a:extLst>
+                  <a:ext uri="{0D108BD9-81ED-4DB2-BD59-A6C34878D82A}">
+                    <a16:rowId xmlns:a16="http://schemas.microsoft.com/office/drawing/2014/main" val="2508935932"/>
+                  </a:ext>
+                </a:extLst>
+              </a:tr>
+              <a:tr h="180000">
+                <a:tc>
+                  <a:txBody>
+                    <a:bodyPr/>
+                    <a:lstStyle/>
+                    <a:p>
+                      <a:endParaRPr lang="zh-CN" altLang="en-US" sz="1400" b="0" dirty="0">
+                        <a:solidFill>
+                          <a:schemeClr val="tx1"/>
+                        </a:solidFill>
+                      </a:endParaRPr>
+                    </a:p>
+                  </a:txBody>
+                  <a:tcPr marL="72000" marR="0" marT="0" marB="0">
+                    <a:lnL w="12700" cap="flat" cmpd="sng" algn="ctr">
+                      <a:noFill/>
+                      <a:prstDash val="solid"/>
+                      <a:round/>
+                      <a:headEnd type="none" w="med" len="med"/>
+                      <a:tailEnd type="none" w="med" len="med"/>
+                    </a:lnL>
+                    <a:lnR w="12700" cap="flat" cmpd="sng" algn="ctr">
+                      <a:noFill/>
+                      <a:prstDash val="solid"/>
+                      <a:round/>
+                      <a:headEnd type="none" w="med" len="med"/>
+                      <a:tailEnd type="none" w="med" len="med"/>
+                    </a:lnR>
+                    <a:lnT w="12700" cap="flat" cmpd="sng" algn="ctr">
+                      <a:noFill/>
+                      <a:prstDash val="solid"/>
+                      <a:round/>
+                      <a:headEnd type="none" w="med" len="med"/>
+                      <a:tailEnd type="none" w="med" len="med"/>
+                    </a:lnT>
+                    <a:lnB w="12700" cap="flat" cmpd="sng" algn="ctr">
+                      <a:noFill/>
+                      <a:prstDash val="solid"/>
+                      <a:round/>
+                      <a:headEnd type="none" w="med" len="med"/>
+                      <a:tailEnd type="none" w="med" len="med"/>
+                    </a:lnB>
+                    <a:lnTlToBr w="12700" cmpd="sng">
+                      <a:noFill/>
+                      <a:prstDash val="solid"/>
+                    </a:lnTlToBr>
+                    <a:lnBlToTr w="12700" cmpd="sng">
+                      <a:noFill/>
+                      <a:prstDash val="solid"/>
+                    </a:lnBlToTr>
+                    <a:solidFill>
+                      <a:schemeClr val="bg1"/>
+                    </a:solidFill>
+                  </a:tcPr>
+                </a:tc>
+                <a:tc>
+                  <a:txBody>
+                    <a:bodyPr/>
+                    <a:lstStyle/>
+                    <a:p>
+                      <a:r>
+                        <a:rPr lang="zh-CN" altLang="en-US" sz="1200" b="0" dirty="0">
+                          <a:solidFill>
+                            <a:schemeClr val="tx1"/>
+                          </a:solidFill>
+                        </a:rPr>
+                        <a:t>极大二分团</a:t>
+                      </a:r>
+                    </a:p>
+                  </a:txBody>
+                  <a:tcPr marL="72000" marR="0" marT="0" marB="0">
+                    <a:lnL w="12700" cap="flat" cmpd="sng" algn="ctr">
+                      <a:noFill/>
+                      <a:prstDash val="solid"/>
+                      <a:round/>
+                      <a:headEnd type="none" w="med" len="med"/>
+                      <a:tailEnd type="none" w="med" len="med"/>
+                    </a:lnL>
+                    <a:lnR w="12700" cap="flat" cmpd="sng" algn="ctr">
+                      <a:noFill/>
+                      <a:prstDash val="solid"/>
+                      <a:round/>
+                      <a:headEnd type="none" w="med" len="med"/>
+                      <a:tailEnd type="none" w="med" len="med"/>
+                    </a:lnR>
+                    <a:lnT w="12700" cap="flat" cmpd="sng" algn="ctr">
+                      <a:noFill/>
+                      <a:prstDash val="solid"/>
+                      <a:round/>
+                      <a:headEnd type="none" w="med" len="med"/>
+                      <a:tailEnd type="none" w="med" len="med"/>
+                    </a:lnT>
+                    <a:lnB w="12700" cap="flat" cmpd="sng" algn="ctr">
+                      <a:noFill/>
+                      <a:prstDash val="solid"/>
+                      <a:round/>
+                      <a:headEnd type="none" w="med" len="med"/>
+                      <a:tailEnd type="none" w="med" len="med"/>
+                    </a:lnB>
+                    <a:lnTlToBr w="12700" cmpd="sng">
+                      <a:noFill/>
+                      <a:prstDash val="solid"/>
+                    </a:lnTlToBr>
+                    <a:lnBlToTr w="12700" cmpd="sng">
+                      <a:noFill/>
+                      <a:prstDash val="solid"/>
+                    </a:lnBlToTr>
+                    <a:solidFill>
+                      <a:schemeClr val="bg1"/>
+                    </a:solidFill>
+                  </a:tcPr>
+                </a:tc>
+                <a:extLst>
+                  <a:ext uri="{0D108BD9-81ED-4DB2-BD59-A6C34878D82A}">
+                    <a16:rowId xmlns:a16="http://schemas.microsoft.com/office/drawing/2014/main" val="1357682551"/>
+                  </a:ext>
+                </a:extLst>
+              </a:tr>
+              <a:tr h="180000">
+                <a:tc>
+                  <a:txBody>
+                    <a:bodyPr/>
+                    <a:lstStyle/>
+                    <a:p>
+                      <a:endParaRPr lang="zh-CN" altLang="en-US" sz="1400" b="0" dirty="0">
+                        <a:solidFill>
+                          <a:schemeClr val="tx1"/>
+                        </a:solidFill>
+                      </a:endParaRPr>
+                    </a:p>
+                  </a:txBody>
+                  <a:tcPr marL="72000" marR="0" marT="0" marB="0">
+                    <a:lnL w="12700" cap="flat" cmpd="sng" algn="ctr">
+                      <a:noFill/>
+                      <a:prstDash val="solid"/>
+                      <a:round/>
+                      <a:headEnd type="none" w="med" len="med"/>
+                      <a:tailEnd type="none" w="med" len="med"/>
+                    </a:lnL>
+                    <a:lnR w="12700" cap="flat" cmpd="sng" algn="ctr">
+                      <a:noFill/>
+                      <a:prstDash val="solid"/>
+                      <a:round/>
+                      <a:headEnd type="none" w="med" len="med"/>
+                      <a:tailEnd type="none" w="med" len="med"/>
+                    </a:lnR>
+                    <a:lnT w="12700" cap="flat" cmpd="sng" algn="ctr">
+                      <a:noFill/>
+                      <a:prstDash val="solid"/>
+                      <a:round/>
+                      <a:headEnd type="none" w="med" len="med"/>
+                      <a:tailEnd type="none" w="med" len="med"/>
+                    </a:lnT>
+                    <a:lnB w="12700" cap="flat" cmpd="sng" algn="ctr">
+                      <a:noFill/>
+                      <a:prstDash val="solid"/>
+                      <a:round/>
+                      <a:headEnd type="none" w="med" len="med"/>
+                      <a:tailEnd type="none" w="med" len="med"/>
+                    </a:lnB>
+                    <a:lnTlToBr w="12700" cmpd="sng">
+                      <a:noFill/>
+                      <a:prstDash val="solid"/>
+                    </a:lnTlToBr>
+                    <a:lnBlToTr w="12700" cmpd="sng">
+                      <a:noFill/>
+                      <a:prstDash val="solid"/>
+                    </a:lnBlToTr>
+                    <a:solidFill>
+                      <a:schemeClr val="bg1"/>
+                    </a:solidFill>
+                  </a:tcPr>
+                </a:tc>
+                <a:tc>
+                  <a:txBody>
+                    <a:bodyPr/>
+                    <a:lstStyle/>
+                    <a:p>
+                      <a:r>
+                        <a:rPr lang="zh-CN" altLang="en-US" sz="1200" b="0" dirty="0">
+                          <a:solidFill>
+                            <a:schemeClr val="tx1"/>
+                          </a:solidFill>
+                        </a:rPr>
+                        <a:t>非极大二分团</a:t>
+                      </a:r>
+                    </a:p>
+                  </a:txBody>
+                  <a:tcPr marL="72000" marR="0" marT="0" marB="0">
+                    <a:lnL w="12700" cap="flat" cmpd="sng" algn="ctr">
+                      <a:noFill/>
+                      <a:prstDash val="solid"/>
+                      <a:round/>
+                      <a:headEnd type="none" w="med" len="med"/>
+                      <a:tailEnd type="none" w="med" len="med"/>
+                    </a:lnL>
+                    <a:lnR w="12700" cap="flat" cmpd="sng" algn="ctr">
+                      <a:noFill/>
+                      <a:prstDash val="solid"/>
+                      <a:round/>
+                      <a:headEnd type="none" w="med" len="med"/>
+                      <a:tailEnd type="none" w="med" len="med"/>
+                    </a:lnR>
+                    <a:lnT w="12700" cap="flat" cmpd="sng" algn="ctr">
+                      <a:noFill/>
+                      <a:prstDash val="solid"/>
+                      <a:round/>
+                      <a:headEnd type="none" w="med" len="med"/>
+                      <a:tailEnd type="none" w="med" len="med"/>
+                    </a:lnT>
+                    <a:lnB w="12700" cap="flat" cmpd="sng" algn="ctr">
+                      <a:noFill/>
+                      <a:prstDash val="solid"/>
+                      <a:round/>
+                      <a:headEnd type="none" w="med" len="med"/>
+                      <a:tailEnd type="none" w="med" len="med"/>
+                    </a:lnB>
+                    <a:lnTlToBr w="12700" cmpd="sng">
+                      <a:noFill/>
+                      <a:prstDash val="solid"/>
+                    </a:lnTlToBr>
+                    <a:lnBlToTr w="12700" cmpd="sng">
+                      <a:noFill/>
+                      <a:prstDash val="solid"/>
+                    </a:lnBlToTr>
+                    <a:solidFill>
+                      <a:schemeClr val="bg1"/>
+                    </a:solidFill>
+                  </a:tcPr>
+                </a:tc>
+                <a:extLst>
+                  <a:ext uri="{0D108BD9-81ED-4DB2-BD59-A6C34878D82A}">
+                    <a16:rowId xmlns:a16="http://schemas.microsoft.com/office/drawing/2014/main" val="726710431"/>
+                  </a:ext>
+                </a:extLst>
+              </a:tr>
+            </a:tbl>
+          </a:graphicData>
+        </a:graphic>
+      </p:graphicFrame>
+      <p:sp>
+        <p:nvSpPr>
+          <p:cNvPr id="4" name="矩形: 圆角 3">
+            <a:extLst>
+              <a:ext uri="{FF2B5EF4-FFF2-40B4-BE49-F238E27FC236}">
+                <a16:creationId xmlns:a16="http://schemas.microsoft.com/office/drawing/2014/main" id="{773890D1-D963-4BF4-AA9E-95AD7DBA331D}"/>
+              </a:ext>
+            </a:extLst>
+          </p:cNvPr>
+          <p:cNvSpPr/>
+          <p:nvPr/>
+        </p:nvSpPr>
+        <p:spPr>
+          <a:xfrm>
+            <a:off x="7846161" y="2326937"/>
+            <a:ext cx="178004" cy="130001"/>
+          </a:xfrm>
+          <a:prstGeom prst="roundRect">
+            <a:avLst/>
+          </a:prstGeom>
+          <a:noFill/>
+          <a:ln>
+            <a:solidFill>
+              <a:srgbClr val="B2B3B7"/>
+            </a:solidFill>
+          </a:ln>
+        </p:spPr>
+        <p:style>
+          <a:lnRef idx="2">
+            <a:schemeClr val="accent1">
+              <a:shade val="50000"/>
+            </a:schemeClr>
+          </a:lnRef>
+          <a:fillRef idx="1">
+            <a:schemeClr val="accent1"/>
+          </a:fillRef>
+          <a:effectRef idx="0">
+            <a:schemeClr val="accent1"/>
+          </a:effectRef>
+          <a:fontRef idx="minor">
+            <a:schemeClr val="lt1"/>
+          </a:fontRef>
+        </p:style>
+        <p:txBody>
+          <a:bodyPr rtlCol="0" anchor="ctr"/>
+          <a:lstStyle/>
+          <a:p>
+            <a:endParaRPr lang="zh-CN" altLang="en-US" sz="1200" b="1" dirty="0">
+              <a:solidFill>
+                <a:schemeClr val="tx1"/>
+              </a:solidFill>
+            </a:endParaRPr>
+          </a:p>
+        </p:txBody>
+      </p:sp>
+      <p:sp>
+        <p:nvSpPr>
+          <p:cNvPr id="5" name="矩形: 圆角 4">
+            <a:extLst>
+              <a:ext uri="{FF2B5EF4-FFF2-40B4-BE49-F238E27FC236}">
+                <a16:creationId xmlns:a16="http://schemas.microsoft.com/office/drawing/2014/main" id="{B6FAF881-4EE0-4D60-A0F8-D5E37CB7A7D9}"/>
+              </a:ext>
+            </a:extLst>
+          </p:cNvPr>
+          <p:cNvSpPr/>
+          <p:nvPr/>
+        </p:nvSpPr>
+        <p:spPr>
+          <a:xfrm>
+            <a:off x="7846161" y="2540558"/>
+            <a:ext cx="178004" cy="130001"/>
+          </a:xfrm>
+          <a:prstGeom prst="roundRect">
+            <a:avLst/>
+          </a:prstGeom>
+          <a:noFill/>
+          <a:ln w="28575">
+            <a:solidFill>
+              <a:schemeClr val="tx1"/>
+            </a:solidFill>
+          </a:ln>
+        </p:spPr>
+        <p:style>
+          <a:lnRef idx="2">
+            <a:schemeClr val="accent1">
+              <a:shade val="50000"/>
+            </a:schemeClr>
+          </a:lnRef>
+          <a:fillRef idx="1">
+            <a:schemeClr val="accent1"/>
+          </a:fillRef>
+          <a:effectRef idx="0">
+            <a:schemeClr val="accent1"/>
+          </a:effectRef>
+          <a:fontRef idx="minor">
+            <a:schemeClr val="lt1"/>
+          </a:fontRef>
+        </p:style>
+        <p:txBody>
+          <a:bodyPr rtlCol="0" anchor="ctr"/>
+          <a:lstStyle/>
+          <a:p>
+            <a:endParaRPr lang="zh-CN" altLang="en-US" sz="1200" b="1" dirty="0">
+              <a:solidFill>
+                <a:schemeClr val="tx1"/>
+              </a:solidFill>
+            </a:endParaRPr>
+          </a:p>
+        </p:txBody>
+      </p:sp>
+      <p:sp>
+        <p:nvSpPr>
+          <p:cNvPr id="6" name="矩形: 圆角 5">
+            <a:extLst>
+              <a:ext uri="{FF2B5EF4-FFF2-40B4-BE49-F238E27FC236}">
+                <a16:creationId xmlns:a16="http://schemas.microsoft.com/office/drawing/2014/main" id="{5974E467-7737-45A4-BCEB-7E5F73E2F0FD}"/>
+              </a:ext>
+            </a:extLst>
+          </p:cNvPr>
+          <p:cNvSpPr/>
+          <p:nvPr/>
+        </p:nvSpPr>
+        <p:spPr>
+          <a:xfrm>
+            <a:off x="7846161" y="2754179"/>
+            <a:ext cx="178004" cy="130001"/>
+          </a:xfrm>
+          <a:prstGeom prst="roundRect">
+            <a:avLst/>
+          </a:prstGeom>
+          <a:noFill/>
+          <a:ln>
+            <a:solidFill>
+              <a:srgbClr val="B2B3B7"/>
+            </a:solidFill>
+            <a:prstDash val="dash"/>
+          </a:ln>
+        </p:spPr>
+        <p:style>
+          <a:lnRef idx="2">
+            <a:schemeClr val="accent1">
+              <a:shade val="50000"/>
+            </a:schemeClr>
+          </a:lnRef>
+          <a:fillRef idx="1">
+            <a:schemeClr val="accent1"/>
+          </a:fillRef>
+          <a:effectRef idx="0">
+            <a:schemeClr val="accent1"/>
+          </a:effectRef>
+          <a:fontRef idx="minor">
+            <a:schemeClr val="lt1"/>
+          </a:fontRef>
+        </p:style>
+        <p:txBody>
+          <a:bodyPr rtlCol="0" anchor="ctr"/>
+          <a:lstStyle/>
+          <a:p>
+            <a:endParaRPr lang="zh-CN" altLang="en-US" sz="1200" b="1" dirty="0">
+              <a:solidFill>
+                <a:schemeClr val="tx1"/>
+              </a:solidFill>
+            </a:endParaRPr>
+          </a:p>
+        </p:txBody>
+      </p:sp>
+      <p:grpSp>
+        <p:nvGrpSpPr>
+          <p:cNvPr id="7" name="组合 6">
+            <a:extLst>
+              <a:ext uri="{FF2B5EF4-FFF2-40B4-BE49-F238E27FC236}">
+                <a16:creationId xmlns:a16="http://schemas.microsoft.com/office/drawing/2014/main" id="{6D5CBBE4-22E2-40C6-9FE3-1326E557CE38}"/>
+              </a:ext>
+            </a:extLst>
+          </p:cNvPr>
+          <p:cNvGrpSpPr/>
+          <p:nvPr/>
+        </p:nvGrpSpPr>
+        <p:grpSpPr>
+          <a:xfrm>
+            <a:off x="4230000" y="3145000"/>
+            <a:ext cx="4661067" cy="409000"/>
+            <a:chOff x="4230000" y="3055000"/>
+            <a:chExt cx="4661067" cy="409000"/>
+          </a:xfrm>
+        </p:grpSpPr>
+        <p:sp>
+          <p:nvSpPr>
+            <p:cNvPr id="8" name="矩形: 圆角 7">
+              <a:extLst>
+                <a:ext uri="{FF2B5EF4-FFF2-40B4-BE49-F238E27FC236}">
+                  <a16:creationId xmlns:a16="http://schemas.microsoft.com/office/drawing/2014/main" id="{7FD95079-AAF4-4E28-832E-487F4E2E8EA1}"/>
+                </a:ext>
+              </a:extLst>
+            </p:cNvPr>
+            <p:cNvSpPr/>
+            <p:nvPr/>
+          </p:nvSpPr>
+          <p:spPr>
+            <a:xfrm>
+              <a:off x="4230000" y="3055000"/>
+              <a:ext cx="756000" cy="389000"/>
+            </a:xfrm>
+            <a:prstGeom prst="roundRect">
+              <a:avLst/>
+            </a:prstGeom>
+            <a:noFill/>
+            <a:ln w="28575">
+              <a:solidFill>
+                <a:schemeClr val="tx1"/>
+              </a:solidFill>
+            </a:ln>
+          </p:spPr>
+          <p:style>
+            <a:lnRef idx="2">
+              <a:schemeClr val="accent1">
+                <a:shade val="50000"/>
+              </a:schemeClr>
+            </a:lnRef>
+            <a:fillRef idx="1">
+              <a:schemeClr val="accent1"/>
+            </a:fillRef>
+            <a:effectRef idx="0">
+              <a:schemeClr val="accent1"/>
+            </a:effectRef>
+            <a:fontRef idx="minor">
+              <a:schemeClr val="lt1"/>
+            </a:fontRef>
+          </p:style>
+          <p:txBody>
+            <a:bodyPr lIns="72000" tIns="0" rIns="36000" bIns="0" rtlCol="0" anchor="ctr">
+              <a:normAutofit fontScale="92500"/>
+            </a:bodyPr>
+            <a:lstStyle/>
+            <a:p>
+              <a:r>
+                <a:rPr lang="en-US" altLang="zh-CN" sz="1200" b="1" dirty="0">
+                  <a:solidFill>
+                    <a:srgbClr val="B2B3B7"/>
+                  </a:solidFill>
+                </a:rPr>
+                <a:t>L: u</a:t>
+              </a:r>
+              <a:r>
+                <a:rPr lang="en-US" altLang="zh-CN" sz="1200" b="1" baseline="-25000" dirty="0">
+                  <a:solidFill>
+                    <a:srgbClr val="B2B3B7"/>
+                  </a:solidFill>
+                </a:rPr>
+                <a:t>1 </a:t>
+              </a:r>
+              <a:r>
+                <a:rPr lang="en-US" altLang="zh-CN" sz="1200" b="1" dirty="0">
+                  <a:solidFill>
+                    <a:srgbClr val="B2B3B7"/>
+                  </a:solidFill>
+                </a:rPr>
+                <a:t>u</a:t>
+              </a:r>
+              <a:r>
+                <a:rPr lang="en-US" altLang="zh-CN" sz="1200" b="1" baseline="-25000" dirty="0">
+                  <a:solidFill>
+                    <a:srgbClr val="B2B3B7"/>
+                  </a:solidFill>
+                </a:rPr>
+                <a:t>2 </a:t>
+              </a:r>
+              <a:r>
+                <a:rPr lang="en-US" altLang="zh-CN" sz="1200" b="1" dirty="0">
+                  <a:solidFill>
+                    <a:srgbClr val="B2B3B7"/>
+                  </a:solidFill>
+                </a:rPr>
+                <a:t>u</a:t>
+              </a:r>
+              <a:r>
+                <a:rPr lang="en-US" altLang="zh-CN" sz="1200" b="1" baseline="-25000" dirty="0">
+                  <a:solidFill>
+                    <a:srgbClr val="B2B3B7"/>
+                  </a:solidFill>
+                </a:rPr>
+                <a:t>4</a:t>
+              </a:r>
+              <a:endParaRPr lang="zh-CN" altLang="en-US" sz="1200" b="1" dirty="0">
+                <a:solidFill>
+                  <a:srgbClr val="B2B3B7"/>
+                </a:solidFill>
+              </a:endParaRPr>
+            </a:p>
+            <a:p>
+              <a:r>
+                <a:rPr lang="en-US" altLang="zh-CN" sz="1200" b="1" dirty="0">
+                  <a:solidFill>
+                    <a:srgbClr val="B2B3B7"/>
+                  </a:solidFill>
+                </a:rPr>
+                <a:t>R: </a:t>
+              </a:r>
+              <a:r>
+                <a:rPr lang="en-US" altLang="zh-CN" sz="1200" b="1" dirty="0">
+                  <a:solidFill>
+                    <a:srgbClr val="000AFF"/>
+                  </a:solidFill>
+                </a:rPr>
+                <a:t>v</a:t>
+              </a:r>
+              <a:r>
+                <a:rPr lang="en-US" altLang="zh-CN" sz="1200" b="1" baseline="-25000" dirty="0">
+                  <a:solidFill>
+                    <a:srgbClr val="000AFF"/>
+                  </a:solidFill>
+                </a:rPr>
+                <a:t>1</a:t>
+              </a:r>
+              <a:endParaRPr lang="zh-CN" altLang="en-US" sz="1200" b="1" dirty="0">
+                <a:solidFill>
+                  <a:srgbClr val="000AFF"/>
+                </a:solidFill>
+              </a:endParaRPr>
+            </a:p>
+          </p:txBody>
+        </p:sp>
+        <p:sp>
+          <p:nvSpPr>
+            <p:cNvPr id="9" name="矩形: 圆角 8">
+              <a:extLst>
+                <a:ext uri="{FF2B5EF4-FFF2-40B4-BE49-F238E27FC236}">
+                  <a16:creationId xmlns:a16="http://schemas.microsoft.com/office/drawing/2014/main" id="{54A99C94-AFF8-4B81-950A-01921CAD1BEE}"/>
+                </a:ext>
+              </a:extLst>
+            </p:cNvPr>
+            <p:cNvSpPr/>
+            <p:nvPr/>
+          </p:nvSpPr>
+          <p:spPr>
+            <a:xfrm>
+              <a:off x="5531689" y="3075000"/>
+              <a:ext cx="756000" cy="389000"/>
+            </a:xfrm>
+            <a:prstGeom prst="roundRect">
+              <a:avLst/>
+            </a:prstGeom>
+            <a:noFill/>
+            <a:ln w="28575">
+              <a:solidFill>
+                <a:schemeClr val="tx1"/>
+              </a:solidFill>
+            </a:ln>
+          </p:spPr>
+          <p:style>
+            <a:lnRef idx="2">
+              <a:schemeClr val="accent1">
+                <a:shade val="50000"/>
+              </a:schemeClr>
+            </a:lnRef>
+            <a:fillRef idx="1">
+              <a:schemeClr val="accent1"/>
+            </a:fillRef>
+            <a:effectRef idx="0">
+              <a:schemeClr val="accent1"/>
+            </a:effectRef>
+            <a:fontRef idx="minor">
+              <a:schemeClr val="lt1"/>
+            </a:fontRef>
+          </p:style>
+          <p:txBody>
+            <a:bodyPr lIns="72000" tIns="0" rIns="36000" bIns="0" rtlCol="0" anchor="ctr">
+              <a:normAutofit fontScale="92500"/>
+            </a:bodyPr>
+            <a:lstStyle/>
+            <a:p>
+              <a:r>
+                <a:rPr lang="en-US" altLang="zh-CN" sz="1200" b="1" dirty="0">
+                  <a:solidFill>
+                    <a:srgbClr val="B2B3B7"/>
+                  </a:solidFill>
+                </a:rPr>
+                <a:t>L: u</a:t>
+              </a:r>
+              <a:r>
+                <a:rPr lang="en-US" altLang="zh-CN" sz="1200" b="1" baseline="-25000" dirty="0">
+                  <a:solidFill>
+                    <a:srgbClr val="B2B3B7"/>
+                  </a:solidFill>
+                </a:rPr>
+                <a:t>1 </a:t>
+              </a:r>
+              <a:r>
+                <a:rPr lang="en-US" altLang="zh-CN" sz="1200" b="1" dirty="0">
+                  <a:solidFill>
+                    <a:srgbClr val="B2B3B7"/>
+                  </a:solidFill>
+                </a:rPr>
+                <a:t>u</a:t>
+              </a:r>
+              <a:r>
+                <a:rPr lang="en-US" altLang="zh-CN" sz="1200" b="1" baseline="-25000" dirty="0">
+                  <a:solidFill>
+                    <a:srgbClr val="B2B3B7"/>
+                  </a:solidFill>
+                </a:rPr>
+                <a:t>2 </a:t>
+              </a:r>
+              <a:r>
+                <a:rPr lang="en-US" altLang="zh-CN" sz="1200" b="1" dirty="0">
+                  <a:solidFill>
+                    <a:srgbClr val="B2B3B7"/>
+                  </a:solidFill>
+                </a:rPr>
+                <a:t>u</a:t>
+              </a:r>
+              <a:r>
+                <a:rPr lang="en-US" altLang="zh-CN" sz="1200" b="1" baseline="-25000" dirty="0">
+                  <a:solidFill>
+                    <a:srgbClr val="B2B3B7"/>
+                  </a:solidFill>
+                </a:rPr>
+                <a:t>3</a:t>
+              </a:r>
+              <a:endParaRPr lang="zh-CN" altLang="en-US" sz="1200" b="1" dirty="0">
+                <a:solidFill>
+                  <a:srgbClr val="B2B3B7"/>
+                </a:solidFill>
+              </a:endParaRPr>
+            </a:p>
+            <a:p>
+              <a:r>
+                <a:rPr lang="en-US" altLang="zh-CN" sz="1200" b="1" dirty="0">
+                  <a:solidFill>
+                    <a:srgbClr val="B2B3B7"/>
+                  </a:solidFill>
+                </a:rPr>
+                <a:t>R: </a:t>
+              </a:r>
+              <a:r>
+                <a:rPr lang="en-US" altLang="zh-CN" sz="1200" b="1" dirty="0">
+                  <a:solidFill>
+                    <a:srgbClr val="000AFF"/>
+                  </a:solidFill>
+                </a:rPr>
+                <a:t>v</a:t>
+              </a:r>
+              <a:r>
+                <a:rPr lang="en-US" altLang="zh-CN" sz="1200" b="1" baseline="-25000" dirty="0">
+                  <a:solidFill>
+                    <a:srgbClr val="000AFF"/>
+                  </a:solidFill>
+                </a:rPr>
+                <a:t>2</a:t>
+              </a:r>
+              <a:endParaRPr lang="zh-CN" altLang="en-US" sz="1200" b="1" dirty="0">
+                <a:solidFill>
+                  <a:srgbClr val="000AFF"/>
+                </a:solidFill>
+              </a:endParaRPr>
+            </a:p>
+          </p:txBody>
+        </p:sp>
+        <p:sp>
+          <p:nvSpPr>
+            <p:cNvPr id="10" name="矩形: 圆角 9">
+              <a:extLst>
+                <a:ext uri="{FF2B5EF4-FFF2-40B4-BE49-F238E27FC236}">
+                  <a16:creationId xmlns:a16="http://schemas.microsoft.com/office/drawing/2014/main" id="{EEA3222F-A5F8-4F18-B2D6-C64AD5AE1DCF}"/>
+                </a:ext>
+              </a:extLst>
+            </p:cNvPr>
+            <p:cNvSpPr/>
+            <p:nvPr/>
+          </p:nvSpPr>
+          <p:spPr>
+            <a:xfrm>
+              <a:off x="6833378" y="3055000"/>
+              <a:ext cx="756000" cy="389000"/>
+            </a:xfrm>
+            <a:prstGeom prst="roundRect">
+              <a:avLst/>
+            </a:prstGeom>
+            <a:noFill/>
+            <a:ln w="28575">
+              <a:solidFill>
+                <a:schemeClr val="tx1"/>
+              </a:solidFill>
+            </a:ln>
+          </p:spPr>
+          <p:style>
+            <a:lnRef idx="2">
+              <a:schemeClr val="accent1">
+                <a:shade val="50000"/>
+              </a:schemeClr>
+            </a:lnRef>
+            <a:fillRef idx="1">
+              <a:schemeClr val="accent1"/>
+            </a:fillRef>
+            <a:effectRef idx="0">
+              <a:schemeClr val="accent1"/>
+            </a:effectRef>
+            <a:fontRef idx="minor">
+              <a:schemeClr val="lt1"/>
+            </a:fontRef>
+          </p:style>
+          <p:txBody>
+            <a:bodyPr lIns="72000" tIns="0" rIns="36000" bIns="0" rtlCol="0" anchor="ctr">
+              <a:normAutofit fontScale="92500"/>
+            </a:bodyPr>
+            <a:lstStyle/>
+            <a:p>
+              <a:r>
+                <a:rPr lang="en-US" altLang="zh-CN" sz="1200" b="1" dirty="0">
+                  <a:solidFill>
+                    <a:srgbClr val="B2B3B7"/>
+                  </a:solidFill>
+                </a:rPr>
+                <a:t>L: u</a:t>
+              </a:r>
+              <a:r>
+                <a:rPr lang="en-US" altLang="zh-CN" sz="1200" b="1" baseline="-25000" dirty="0">
+                  <a:solidFill>
+                    <a:srgbClr val="B2B3B7"/>
+                  </a:solidFill>
+                </a:rPr>
+                <a:t>1 </a:t>
+              </a:r>
+              <a:r>
+                <a:rPr lang="en-US" altLang="zh-CN" sz="1200" b="1" dirty="0">
+                  <a:solidFill>
+                    <a:srgbClr val="B2B3B7"/>
+                  </a:solidFill>
+                </a:rPr>
+                <a:t>u</a:t>
+              </a:r>
+              <a:r>
+                <a:rPr lang="en-US" altLang="zh-CN" sz="1200" b="1" baseline="-25000" dirty="0">
+                  <a:solidFill>
+                    <a:srgbClr val="B2B3B7"/>
+                  </a:solidFill>
+                </a:rPr>
+                <a:t>3 </a:t>
+              </a:r>
+              <a:r>
+                <a:rPr lang="en-US" altLang="zh-CN" sz="1200" b="1" dirty="0">
+                  <a:solidFill>
+                    <a:srgbClr val="B2B3B7"/>
+                  </a:solidFill>
+                </a:rPr>
+                <a:t>u</a:t>
+              </a:r>
+              <a:r>
+                <a:rPr lang="en-US" altLang="zh-CN" sz="1200" b="1" baseline="-25000" dirty="0">
+                  <a:solidFill>
+                    <a:srgbClr val="B2B3B7"/>
+                  </a:solidFill>
+                </a:rPr>
+                <a:t>5</a:t>
+              </a:r>
+              <a:endParaRPr lang="zh-CN" altLang="en-US" sz="1200" b="1" dirty="0">
+                <a:solidFill>
+                  <a:srgbClr val="B2B3B7"/>
+                </a:solidFill>
+              </a:endParaRPr>
+            </a:p>
+            <a:p>
+              <a:r>
+                <a:rPr lang="en-US" altLang="zh-CN" sz="1200" b="1" dirty="0">
+                  <a:solidFill>
+                    <a:srgbClr val="B2B3B7"/>
+                  </a:solidFill>
+                </a:rPr>
+                <a:t>R: </a:t>
+              </a:r>
+              <a:r>
+                <a:rPr lang="en-US" altLang="zh-CN" sz="1200" b="1" dirty="0">
+                  <a:solidFill>
+                    <a:srgbClr val="000AFF"/>
+                  </a:solidFill>
+                </a:rPr>
+                <a:t>v</a:t>
+              </a:r>
+              <a:r>
+                <a:rPr lang="en-US" altLang="zh-CN" sz="1200" b="1" baseline="-25000" dirty="0">
+                  <a:solidFill>
+                    <a:srgbClr val="000AFF"/>
+                  </a:solidFill>
+                </a:rPr>
+                <a:t>3</a:t>
+              </a:r>
+              <a:endParaRPr lang="zh-CN" altLang="en-US" sz="1200" b="1" dirty="0">
+                <a:solidFill>
+                  <a:srgbClr val="000AFF"/>
+                </a:solidFill>
+              </a:endParaRPr>
+            </a:p>
+          </p:txBody>
+        </p:sp>
+        <p:sp>
+          <p:nvSpPr>
+            <p:cNvPr id="11" name="矩形: 圆角 10">
+              <a:extLst>
+                <a:ext uri="{FF2B5EF4-FFF2-40B4-BE49-F238E27FC236}">
+                  <a16:creationId xmlns:a16="http://schemas.microsoft.com/office/drawing/2014/main" id="{EDC1CE31-0408-4EFD-948C-3AD0A2BBA905}"/>
+                </a:ext>
+              </a:extLst>
+            </p:cNvPr>
+            <p:cNvSpPr/>
+            <p:nvPr/>
+          </p:nvSpPr>
+          <p:spPr>
+            <a:xfrm>
+              <a:off x="8135067" y="3055000"/>
+              <a:ext cx="756000" cy="389000"/>
+            </a:xfrm>
+            <a:prstGeom prst="roundRect">
+              <a:avLst/>
+            </a:prstGeom>
+            <a:noFill/>
+            <a:ln w="28575">
+              <a:solidFill>
+                <a:schemeClr val="tx1"/>
+              </a:solidFill>
+            </a:ln>
+          </p:spPr>
+          <p:style>
+            <a:lnRef idx="2">
+              <a:schemeClr val="accent1">
+                <a:shade val="50000"/>
+              </a:schemeClr>
+            </a:lnRef>
+            <a:fillRef idx="1">
+              <a:schemeClr val="accent1"/>
+            </a:fillRef>
+            <a:effectRef idx="0">
+              <a:schemeClr val="accent1"/>
+            </a:effectRef>
+            <a:fontRef idx="minor">
+              <a:schemeClr val="lt1"/>
+            </a:fontRef>
+          </p:style>
+          <p:txBody>
+            <a:bodyPr lIns="72000" tIns="0" rIns="36000" bIns="0" rtlCol="0" anchor="ctr">
+              <a:normAutofit fontScale="92500"/>
+            </a:bodyPr>
+            <a:lstStyle/>
+            <a:p>
+              <a:r>
+                <a:rPr lang="en-US" altLang="zh-CN" sz="1200" b="1" dirty="0">
+                  <a:solidFill>
+                    <a:srgbClr val="B2B3B7"/>
+                  </a:solidFill>
+                </a:rPr>
+                <a:t>L: u</a:t>
+              </a:r>
+              <a:r>
+                <a:rPr lang="en-US" altLang="zh-CN" sz="1200" b="1" baseline="-25000" dirty="0">
+                  <a:solidFill>
+                    <a:srgbClr val="B2B3B7"/>
+                  </a:solidFill>
+                </a:rPr>
+                <a:t>1 </a:t>
+              </a:r>
+              <a:r>
+                <a:rPr lang="en-US" altLang="zh-CN" sz="1200" b="1" dirty="0">
+                  <a:solidFill>
+                    <a:srgbClr val="B2B3B7"/>
+                  </a:solidFill>
+                </a:rPr>
+                <a:t>u</a:t>
+              </a:r>
+              <a:r>
+                <a:rPr lang="en-US" altLang="zh-CN" sz="1200" b="1" baseline="-25000" dirty="0">
+                  <a:solidFill>
+                    <a:srgbClr val="B2B3B7"/>
+                  </a:solidFill>
+                </a:rPr>
+                <a:t>3 </a:t>
+              </a:r>
+              <a:r>
+                <a:rPr lang="en-US" altLang="zh-CN" sz="1200" b="1" dirty="0">
+                  <a:solidFill>
+                    <a:srgbClr val="B2B3B7"/>
+                  </a:solidFill>
+                </a:rPr>
+                <a:t>u</a:t>
+              </a:r>
+              <a:r>
+                <a:rPr lang="en-US" altLang="zh-CN" sz="1200" b="1" baseline="-25000" dirty="0">
+                  <a:solidFill>
+                    <a:srgbClr val="B2B3B7"/>
+                  </a:solidFill>
+                </a:rPr>
+                <a:t>4</a:t>
+              </a:r>
+              <a:endParaRPr lang="zh-CN" altLang="en-US" sz="1200" b="1" dirty="0">
+                <a:solidFill>
+                  <a:srgbClr val="B2B3B7"/>
+                </a:solidFill>
+              </a:endParaRPr>
+            </a:p>
+            <a:p>
+              <a:r>
+                <a:rPr lang="en-US" altLang="zh-CN" sz="1200" b="1" dirty="0">
+                  <a:solidFill>
+                    <a:srgbClr val="B2B3B7"/>
+                  </a:solidFill>
+                </a:rPr>
+                <a:t>R: </a:t>
+              </a:r>
+              <a:r>
+                <a:rPr lang="en-US" altLang="zh-CN" sz="1200" b="1" dirty="0">
+                  <a:solidFill>
+                    <a:srgbClr val="000AFF"/>
+                  </a:solidFill>
+                </a:rPr>
+                <a:t>v</a:t>
+              </a:r>
+              <a:r>
+                <a:rPr lang="en-US" altLang="zh-CN" sz="1200" b="1" baseline="-25000" dirty="0">
+                  <a:solidFill>
+                    <a:srgbClr val="000AFF"/>
+                  </a:solidFill>
+                </a:rPr>
+                <a:t>4</a:t>
+              </a:r>
+              <a:endParaRPr lang="zh-CN" altLang="en-US" sz="1200" b="1" dirty="0">
+                <a:solidFill>
+                  <a:srgbClr val="000AFF"/>
+                </a:solidFill>
+              </a:endParaRPr>
+            </a:p>
+          </p:txBody>
+        </p:sp>
+      </p:grpSp>
+      <p:grpSp>
+        <p:nvGrpSpPr>
+          <p:cNvPr id="12" name="组合 11">
+            <a:extLst>
+              <a:ext uri="{FF2B5EF4-FFF2-40B4-BE49-F238E27FC236}">
+                <a16:creationId xmlns:a16="http://schemas.microsoft.com/office/drawing/2014/main" id="{BDA7205F-7EB7-48A5-B2E4-3F0BB7B8AD22}"/>
+              </a:ext>
+            </a:extLst>
+          </p:cNvPr>
+          <p:cNvGrpSpPr/>
+          <p:nvPr/>
+        </p:nvGrpSpPr>
+        <p:grpSpPr>
+          <a:xfrm>
+            <a:off x="3240000" y="3970000"/>
+            <a:ext cx="5868000" cy="389000"/>
+            <a:chOff x="3240000" y="3790000"/>
+            <a:chExt cx="5868000" cy="389000"/>
+          </a:xfrm>
+        </p:grpSpPr>
+        <p:sp>
+          <p:nvSpPr>
+            <p:cNvPr id="13" name="矩形: 圆角 12">
+              <a:extLst>
+                <a:ext uri="{FF2B5EF4-FFF2-40B4-BE49-F238E27FC236}">
+                  <a16:creationId xmlns:a16="http://schemas.microsoft.com/office/drawing/2014/main" id="{2AE0E5D6-A382-4122-99D4-C1C3D33600AA}"/>
+                </a:ext>
+              </a:extLst>
+            </p:cNvPr>
+            <p:cNvSpPr/>
+            <p:nvPr/>
+          </p:nvSpPr>
+          <p:spPr>
+            <a:xfrm>
+              <a:off x="3240000" y="3790000"/>
+              <a:ext cx="648000" cy="389000"/>
+            </a:xfrm>
+            <a:prstGeom prst="roundRect">
+              <a:avLst/>
+            </a:prstGeom>
+            <a:noFill/>
+            <a:ln w="28575">
+              <a:solidFill>
+                <a:schemeClr val="tx1"/>
+              </a:solidFill>
+            </a:ln>
+          </p:spPr>
+          <p:style>
+            <a:lnRef idx="2">
+              <a:schemeClr val="accent1">
+                <a:shade val="50000"/>
+              </a:schemeClr>
+            </a:lnRef>
+            <a:fillRef idx="1">
+              <a:schemeClr val="accent1"/>
+            </a:fillRef>
+            <a:effectRef idx="0">
+              <a:schemeClr val="accent1"/>
+            </a:effectRef>
+            <a:fontRef idx="minor">
+              <a:schemeClr val="lt1"/>
+            </a:fontRef>
+          </p:style>
+          <p:txBody>
+            <a:bodyPr lIns="72000" tIns="0" rIns="36000" bIns="0" rtlCol="0" anchor="ctr">
+              <a:normAutofit lnSpcReduction="10000"/>
+            </a:bodyPr>
+            <a:lstStyle/>
+            <a:p>
+              <a:r>
+                <a:rPr lang="en-US" altLang="zh-CN" sz="1200" b="1" dirty="0">
+                  <a:solidFill>
+                    <a:srgbClr val="B2B3B7"/>
+                  </a:solidFill>
+                </a:rPr>
+                <a:t>L: u</a:t>
+              </a:r>
+              <a:r>
+                <a:rPr lang="en-US" altLang="zh-CN" sz="1200" b="1" baseline="-25000" dirty="0">
+                  <a:solidFill>
+                    <a:srgbClr val="B2B3B7"/>
+                  </a:solidFill>
+                </a:rPr>
+                <a:t>1 </a:t>
+              </a:r>
+              <a:r>
+                <a:rPr lang="en-US" altLang="zh-CN" sz="1200" b="1" dirty="0">
+                  <a:solidFill>
+                    <a:srgbClr val="B2B3B7"/>
+                  </a:solidFill>
+                </a:rPr>
+                <a:t>u</a:t>
+              </a:r>
+              <a:r>
+                <a:rPr lang="en-US" altLang="zh-CN" sz="1200" b="1" baseline="-25000" dirty="0">
+                  <a:solidFill>
+                    <a:srgbClr val="B2B3B7"/>
+                  </a:solidFill>
+                </a:rPr>
+                <a:t>2</a:t>
+              </a:r>
+              <a:endParaRPr lang="zh-CN" altLang="en-US" sz="1200" b="1" dirty="0">
+                <a:solidFill>
+                  <a:srgbClr val="B2B3B7"/>
+                </a:solidFill>
+              </a:endParaRPr>
+            </a:p>
+            <a:p>
+              <a:r>
+                <a:rPr lang="en-US" altLang="zh-CN" sz="1200" b="1" dirty="0">
+                  <a:solidFill>
+                    <a:srgbClr val="B2B3B7"/>
+                  </a:solidFill>
+                </a:rPr>
+                <a:t>R: </a:t>
+              </a:r>
+              <a:r>
+                <a:rPr lang="en-US" altLang="zh-CN" sz="1200" b="1" dirty="0">
+                  <a:solidFill>
+                    <a:srgbClr val="000AFF"/>
+                  </a:solidFill>
+                </a:rPr>
+                <a:t>v</a:t>
+              </a:r>
+              <a:r>
+                <a:rPr lang="en-US" altLang="zh-CN" sz="1200" b="1" baseline="-25000" dirty="0">
+                  <a:solidFill>
+                    <a:srgbClr val="000AFF"/>
+                  </a:solidFill>
+                </a:rPr>
+                <a:t>1 </a:t>
+              </a:r>
+              <a:r>
+                <a:rPr lang="en-US" altLang="zh-CN" sz="1200" b="1" dirty="0">
+                  <a:solidFill>
+                    <a:srgbClr val="000AFF"/>
+                  </a:solidFill>
+                </a:rPr>
+                <a:t>v</a:t>
+              </a:r>
+              <a:r>
+                <a:rPr lang="en-US" altLang="zh-CN" sz="1200" b="1" baseline="-25000" dirty="0">
+                  <a:solidFill>
+                    <a:srgbClr val="000AFF"/>
+                  </a:solidFill>
+                </a:rPr>
+                <a:t>2</a:t>
+              </a:r>
+              <a:endParaRPr lang="zh-CN" altLang="en-US" sz="1200" b="1" dirty="0">
+                <a:solidFill>
+                  <a:srgbClr val="000AFF"/>
+                </a:solidFill>
+              </a:endParaRPr>
+            </a:p>
+          </p:txBody>
+        </p:sp>
+        <p:sp>
+          <p:nvSpPr>
+            <p:cNvPr id="14" name="矩形: 圆角 13">
+              <a:extLst>
+                <a:ext uri="{FF2B5EF4-FFF2-40B4-BE49-F238E27FC236}">
+                  <a16:creationId xmlns:a16="http://schemas.microsoft.com/office/drawing/2014/main" id="{2910BFD1-92BD-4705-976A-9D138315EDA8}"/>
+                </a:ext>
+              </a:extLst>
+            </p:cNvPr>
+            <p:cNvSpPr/>
+            <p:nvPr/>
+          </p:nvSpPr>
+          <p:spPr>
+            <a:xfrm>
+              <a:off x="4284000" y="3790000"/>
+              <a:ext cx="648000" cy="389000"/>
+            </a:xfrm>
+            <a:prstGeom prst="roundRect">
+              <a:avLst/>
+            </a:prstGeom>
+            <a:noFill/>
+            <a:ln>
+              <a:solidFill>
+                <a:srgbClr val="B2B3B7"/>
+              </a:solidFill>
+              <a:prstDash val="dash"/>
+            </a:ln>
+          </p:spPr>
+          <p:style>
+            <a:lnRef idx="2">
+              <a:schemeClr val="accent1">
+                <a:shade val="50000"/>
+              </a:schemeClr>
+            </a:lnRef>
+            <a:fillRef idx="1">
+              <a:schemeClr val="accent1"/>
+            </a:fillRef>
+            <a:effectRef idx="0">
+              <a:schemeClr val="accent1"/>
+            </a:effectRef>
+            <a:fontRef idx="minor">
+              <a:schemeClr val="lt1"/>
+            </a:fontRef>
+          </p:style>
+          <p:txBody>
+            <a:bodyPr lIns="72000" tIns="0" rIns="36000" bIns="0" rtlCol="0" anchor="ctr">
+              <a:normAutofit lnSpcReduction="10000"/>
+            </a:bodyPr>
+            <a:lstStyle/>
+            <a:p>
+              <a:r>
+                <a:rPr lang="en-US" altLang="zh-CN" sz="1200" b="1" dirty="0">
+                  <a:solidFill>
+                    <a:srgbClr val="B2B3B7"/>
+                  </a:solidFill>
+                </a:rPr>
+                <a:t>L: u</a:t>
+              </a:r>
+              <a:r>
+                <a:rPr lang="en-US" altLang="zh-CN" sz="1200" b="1" baseline="-25000" dirty="0">
+                  <a:solidFill>
+                    <a:srgbClr val="B2B3B7"/>
+                  </a:solidFill>
+                </a:rPr>
+                <a:t>1</a:t>
+              </a:r>
+              <a:endParaRPr lang="zh-CN" altLang="en-US" sz="1200" b="1" dirty="0">
+                <a:solidFill>
+                  <a:srgbClr val="B2B3B7"/>
+                </a:solidFill>
+              </a:endParaRPr>
+            </a:p>
+            <a:p>
+              <a:r>
+                <a:rPr lang="en-US" altLang="zh-CN" sz="1200" b="1" dirty="0">
+                  <a:solidFill>
+                    <a:srgbClr val="B2B3B7"/>
+                  </a:solidFill>
+                </a:rPr>
+                <a:t>R: </a:t>
+              </a:r>
+              <a:r>
+                <a:rPr lang="en-US" altLang="zh-CN" sz="1200" b="1" dirty="0">
+                  <a:solidFill>
+                    <a:srgbClr val="000AFF"/>
+                  </a:solidFill>
+                </a:rPr>
+                <a:t>v</a:t>
+              </a:r>
+              <a:r>
+                <a:rPr lang="en-US" altLang="zh-CN" sz="1200" b="1" baseline="-25000" dirty="0">
+                  <a:solidFill>
+                    <a:srgbClr val="000AFF"/>
+                  </a:solidFill>
+                </a:rPr>
+                <a:t>1 </a:t>
+              </a:r>
+              <a:r>
+                <a:rPr lang="en-US" altLang="zh-CN" sz="1200" b="1" dirty="0">
+                  <a:solidFill>
+                    <a:srgbClr val="000AFF"/>
+                  </a:solidFill>
+                </a:rPr>
+                <a:t>v</a:t>
+              </a:r>
+              <a:r>
+                <a:rPr lang="en-US" altLang="zh-CN" sz="1200" b="1" baseline="-25000" dirty="0">
+                  <a:solidFill>
+                    <a:srgbClr val="000AFF"/>
+                  </a:solidFill>
+                </a:rPr>
+                <a:t>3</a:t>
+              </a:r>
+              <a:endParaRPr lang="zh-CN" altLang="en-US" sz="1200" b="1" dirty="0">
+                <a:solidFill>
+                  <a:srgbClr val="000AFF"/>
+                </a:solidFill>
+              </a:endParaRPr>
+            </a:p>
+          </p:txBody>
+        </p:sp>
+        <p:sp>
+          <p:nvSpPr>
+            <p:cNvPr id="15" name="矩形: 圆角 14">
+              <a:extLst>
+                <a:ext uri="{FF2B5EF4-FFF2-40B4-BE49-F238E27FC236}">
+                  <a16:creationId xmlns:a16="http://schemas.microsoft.com/office/drawing/2014/main" id="{D3E5A806-7272-4528-8B56-739B2749B076}"/>
+                </a:ext>
+              </a:extLst>
+            </p:cNvPr>
+            <p:cNvSpPr/>
+            <p:nvPr/>
+          </p:nvSpPr>
+          <p:spPr>
+            <a:xfrm>
+              <a:off x="5328000" y="3790000"/>
+              <a:ext cx="648000" cy="389000"/>
+            </a:xfrm>
+            <a:prstGeom prst="roundRect">
+              <a:avLst/>
+            </a:prstGeom>
+            <a:noFill/>
+            <a:ln w="28575">
+              <a:solidFill>
+                <a:schemeClr val="tx1"/>
+              </a:solidFill>
+            </a:ln>
+          </p:spPr>
+          <p:style>
+            <a:lnRef idx="2">
+              <a:schemeClr val="accent1">
+                <a:shade val="50000"/>
+              </a:schemeClr>
+            </a:lnRef>
+            <a:fillRef idx="1">
+              <a:schemeClr val="accent1"/>
+            </a:fillRef>
+            <a:effectRef idx="0">
+              <a:schemeClr val="accent1"/>
+            </a:effectRef>
+            <a:fontRef idx="minor">
+              <a:schemeClr val="lt1"/>
+            </a:fontRef>
+          </p:style>
+          <p:txBody>
+            <a:bodyPr lIns="72000" tIns="0" rIns="36000" bIns="0" rtlCol="0" anchor="ctr">
+              <a:normAutofit lnSpcReduction="10000"/>
+            </a:bodyPr>
+            <a:lstStyle/>
+            <a:p>
+              <a:r>
+                <a:rPr lang="en-US" altLang="zh-CN" sz="1200" b="1" dirty="0">
+                  <a:solidFill>
+                    <a:srgbClr val="B2B3B7"/>
+                  </a:solidFill>
+                </a:rPr>
+                <a:t>L: u</a:t>
+              </a:r>
+              <a:r>
+                <a:rPr lang="en-US" altLang="zh-CN" sz="1200" b="1" baseline="-25000" dirty="0">
+                  <a:solidFill>
+                    <a:srgbClr val="B2B3B7"/>
+                  </a:solidFill>
+                </a:rPr>
+                <a:t>1 </a:t>
+              </a:r>
+              <a:r>
+                <a:rPr lang="en-US" altLang="zh-CN" sz="1200" b="1" dirty="0">
+                  <a:solidFill>
+                    <a:srgbClr val="B2B3B7"/>
+                  </a:solidFill>
+                </a:rPr>
+                <a:t>u</a:t>
+              </a:r>
+              <a:r>
+                <a:rPr lang="en-US" altLang="zh-CN" sz="1200" b="1" baseline="-25000" dirty="0">
+                  <a:solidFill>
+                    <a:srgbClr val="B2B3B7"/>
+                  </a:solidFill>
+                </a:rPr>
+                <a:t>4</a:t>
+              </a:r>
+              <a:endParaRPr lang="zh-CN" altLang="en-US" sz="1200" b="1" dirty="0">
+                <a:solidFill>
+                  <a:srgbClr val="B2B3B7"/>
+                </a:solidFill>
+              </a:endParaRPr>
+            </a:p>
+            <a:p>
+              <a:r>
+                <a:rPr lang="en-US" altLang="zh-CN" sz="1200" b="1" dirty="0">
+                  <a:solidFill>
+                    <a:srgbClr val="B2B3B7"/>
+                  </a:solidFill>
+                </a:rPr>
+                <a:t>R: </a:t>
+              </a:r>
+              <a:r>
+                <a:rPr lang="en-US" altLang="zh-CN" sz="1200" b="1" dirty="0">
+                  <a:solidFill>
+                    <a:srgbClr val="000AFF"/>
+                  </a:solidFill>
+                </a:rPr>
+                <a:t>v</a:t>
+              </a:r>
+              <a:r>
+                <a:rPr lang="en-US" altLang="zh-CN" sz="1200" b="1" baseline="-25000" dirty="0">
+                  <a:solidFill>
+                    <a:srgbClr val="000AFF"/>
+                  </a:solidFill>
+                </a:rPr>
+                <a:t>1 </a:t>
+              </a:r>
+              <a:r>
+                <a:rPr lang="en-US" altLang="zh-CN" sz="1200" b="1" dirty="0">
+                  <a:solidFill>
+                    <a:srgbClr val="000AFF"/>
+                  </a:solidFill>
+                </a:rPr>
+                <a:t>v</a:t>
+              </a:r>
+              <a:r>
+                <a:rPr lang="en-US" altLang="zh-CN" sz="1200" b="1" baseline="-25000" dirty="0">
+                  <a:solidFill>
+                    <a:srgbClr val="000AFF"/>
+                  </a:solidFill>
+                </a:rPr>
+                <a:t>4</a:t>
+              </a:r>
+              <a:endParaRPr lang="zh-CN" altLang="en-US" sz="1200" b="1" dirty="0">
+                <a:solidFill>
+                  <a:srgbClr val="000AFF"/>
+                </a:solidFill>
+              </a:endParaRPr>
+            </a:p>
+          </p:txBody>
+        </p:sp>
+        <p:sp>
+          <p:nvSpPr>
+            <p:cNvPr id="16" name="矩形: 圆角 15">
+              <a:extLst>
+                <a:ext uri="{FF2B5EF4-FFF2-40B4-BE49-F238E27FC236}">
+                  <a16:creationId xmlns:a16="http://schemas.microsoft.com/office/drawing/2014/main" id="{F05E5D0D-12D8-48F2-A0E9-C85191371E05}"/>
+                </a:ext>
+              </a:extLst>
+            </p:cNvPr>
+            <p:cNvSpPr/>
+            <p:nvPr/>
+          </p:nvSpPr>
+          <p:spPr>
+            <a:xfrm>
+              <a:off x="6372000" y="3790000"/>
+              <a:ext cx="648000" cy="389000"/>
+            </a:xfrm>
+            <a:prstGeom prst="roundRect">
+              <a:avLst/>
+            </a:prstGeom>
+            <a:noFill/>
+            <a:ln>
+              <a:solidFill>
+                <a:srgbClr val="B2B3B7"/>
+              </a:solidFill>
+              <a:prstDash val="dash"/>
+            </a:ln>
+          </p:spPr>
+          <p:style>
+            <a:lnRef idx="2">
+              <a:schemeClr val="accent1">
+                <a:shade val="50000"/>
+              </a:schemeClr>
+            </a:lnRef>
+            <a:fillRef idx="1">
+              <a:schemeClr val="accent1"/>
+            </a:fillRef>
+            <a:effectRef idx="0">
+              <a:schemeClr val="accent1"/>
+            </a:effectRef>
+            <a:fontRef idx="minor">
+              <a:schemeClr val="lt1"/>
+            </a:fontRef>
+          </p:style>
+          <p:txBody>
+            <a:bodyPr lIns="72000" tIns="0" rIns="36000" bIns="0" rtlCol="0" anchor="ctr">
+              <a:normAutofit lnSpcReduction="10000"/>
+            </a:bodyPr>
+            <a:lstStyle/>
+            <a:p>
+              <a:r>
+                <a:rPr lang="en-US" altLang="zh-CN" sz="1200" b="1" dirty="0">
+                  <a:solidFill>
+                    <a:srgbClr val="B2B3B7"/>
+                  </a:solidFill>
+                </a:rPr>
+                <a:t>L: u</a:t>
+              </a:r>
+              <a:r>
+                <a:rPr lang="en-US" altLang="zh-CN" sz="1200" b="1" baseline="-25000" dirty="0">
+                  <a:solidFill>
+                    <a:srgbClr val="B2B3B7"/>
+                  </a:solidFill>
+                </a:rPr>
+                <a:t>1 </a:t>
+              </a:r>
+              <a:r>
+                <a:rPr lang="en-US" altLang="zh-CN" sz="1200" b="1" dirty="0">
+                  <a:solidFill>
+                    <a:srgbClr val="B2B3B7"/>
+                  </a:solidFill>
+                </a:rPr>
+                <a:t>u</a:t>
+              </a:r>
+              <a:r>
+                <a:rPr lang="en-US" altLang="zh-CN" sz="1200" b="1" baseline="-25000" dirty="0">
+                  <a:solidFill>
+                    <a:srgbClr val="B2B3B7"/>
+                  </a:solidFill>
+                </a:rPr>
+                <a:t>3</a:t>
+              </a:r>
+              <a:endParaRPr lang="zh-CN" altLang="en-US" sz="1200" b="1" dirty="0">
+                <a:solidFill>
+                  <a:srgbClr val="B2B3B7"/>
+                </a:solidFill>
+              </a:endParaRPr>
+            </a:p>
+            <a:p>
+              <a:r>
+                <a:rPr lang="en-US" altLang="zh-CN" sz="1200" b="1" dirty="0">
+                  <a:solidFill>
+                    <a:srgbClr val="B2B3B7"/>
+                  </a:solidFill>
+                </a:rPr>
+                <a:t>R: </a:t>
+              </a:r>
+              <a:r>
+                <a:rPr lang="en-US" altLang="zh-CN" sz="1200" b="1" dirty="0">
+                  <a:solidFill>
+                    <a:srgbClr val="000AFF"/>
+                  </a:solidFill>
+                </a:rPr>
+                <a:t>v</a:t>
+              </a:r>
+              <a:r>
+                <a:rPr lang="en-US" altLang="zh-CN" sz="1200" b="1" baseline="-25000" dirty="0">
+                  <a:solidFill>
+                    <a:srgbClr val="000AFF"/>
+                  </a:solidFill>
+                </a:rPr>
+                <a:t>2 </a:t>
+              </a:r>
+              <a:r>
+                <a:rPr lang="en-US" altLang="zh-CN" sz="1200" b="1" dirty="0">
+                  <a:solidFill>
+                    <a:srgbClr val="000AFF"/>
+                  </a:solidFill>
+                </a:rPr>
+                <a:t>v</a:t>
+              </a:r>
+              <a:r>
+                <a:rPr lang="en-US" altLang="zh-CN" sz="1200" b="1" baseline="-25000" dirty="0">
+                  <a:solidFill>
+                    <a:srgbClr val="000AFF"/>
+                  </a:solidFill>
+                </a:rPr>
+                <a:t>3</a:t>
+              </a:r>
+              <a:endParaRPr lang="zh-CN" altLang="en-US" sz="1200" b="1" dirty="0">
+                <a:solidFill>
+                  <a:srgbClr val="000AFF"/>
+                </a:solidFill>
+              </a:endParaRPr>
+            </a:p>
+          </p:txBody>
+        </p:sp>
+        <p:sp>
+          <p:nvSpPr>
+            <p:cNvPr id="17" name="矩形: 圆角 16">
+              <a:extLst>
+                <a:ext uri="{FF2B5EF4-FFF2-40B4-BE49-F238E27FC236}">
+                  <a16:creationId xmlns:a16="http://schemas.microsoft.com/office/drawing/2014/main" id="{05E3ACFF-F58B-4B83-83B5-A11BE5005B48}"/>
+                </a:ext>
+              </a:extLst>
+            </p:cNvPr>
+            <p:cNvSpPr/>
+            <p:nvPr/>
+          </p:nvSpPr>
+          <p:spPr>
+            <a:xfrm>
+              <a:off x="7416000" y="3790000"/>
+              <a:ext cx="648000" cy="389000"/>
+            </a:xfrm>
+            <a:prstGeom prst="roundRect">
+              <a:avLst/>
+            </a:prstGeom>
+            <a:noFill/>
+            <a:ln>
+              <a:solidFill>
+                <a:srgbClr val="B2B3B7"/>
+              </a:solidFill>
+              <a:prstDash val="dash"/>
+            </a:ln>
+          </p:spPr>
+          <p:style>
+            <a:lnRef idx="2">
+              <a:schemeClr val="accent1">
+                <a:shade val="50000"/>
+              </a:schemeClr>
+            </a:lnRef>
+            <a:fillRef idx="1">
+              <a:schemeClr val="accent1"/>
+            </a:fillRef>
+            <a:effectRef idx="0">
+              <a:schemeClr val="accent1"/>
+            </a:effectRef>
+            <a:fontRef idx="minor">
+              <a:schemeClr val="lt1"/>
+            </a:fontRef>
+          </p:style>
+          <p:txBody>
+            <a:bodyPr lIns="72000" tIns="0" rIns="36000" bIns="0" rtlCol="0" anchor="ctr">
+              <a:normAutofit lnSpcReduction="10000"/>
+            </a:bodyPr>
+            <a:lstStyle/>
+            <a:p>
+              <a:r>
+                <a:rPr lang="en-US" altLang="zh-CN" sz="1200" b="1" dirty="0">
+                  <a:solidFill>
+                    <a:srgbClr val="B2B3B7"/>
+                  </a:solidFill>
+                </a:rPr>
+                <a:t>L: u</a:t>
+              </a:r>
+              <a:r>
+                <a:rPr lang="en-US" altLang="zh-CN" sz="1200" b="1" baseline="-25000" dirty="0">
+                  <a:solidFill>
+                    <a:srgbClr val="B2B3B7"/>
+                  </a:solidFill>
+                </a:rPr>
+                <a:t>1 </a:t>
+              </a:r>
+              <a:r>
+                <a:rPr lang="en-US" altLang="zh-CN" sz="1200" b="1" dirty="0">
+                  <a:solidFill>
+                    <a:srgbClr val="B2B3B7"/>
+                  </a:solidFill>
+                </a:rPr>
+                <a:t>u</a:t>
+              </a:r>
+              <a:r>
+                <a:rPr lang="en-US" altLang="zh-CN" sz="1200" b="1" baseline="-25000" dirty="0">
+                  <a:solidFill>
+                    <a:srgbClr val="B2B3B7"/>
+                  </a:solidFill>
+                </a:rPr>
+                <a:t>3</a:t>
+              </a:r>
+              <a:endParaRPr lang="zh-CN" altLang="en-US" sz="1200" b="1" dirty="0">
+                <a:solidFill>
+                  <a:srgbClr val="B2B3B7"/>
+                </a:solidFill>
+              </a:endParaRPr>
+            </a:p>
+            <a:p>
+              <a:r>
+                <a:rPr lang="en-US" altLang="zh-CN" sz="1200" b="1" dirty="0">
+                  <a:solidFill>
+                    <a:srgbClr val="B2B3B7"/>
+                  </a:solidFill>
+                </a:rPr>
+                <a:t>R: </a:t>
+              </a:r>
+              <a:r>
+                <a:rPr lang="en-US" altLang="zh-CN" sz="1200" b="1" dirty="0">
+                  <a:solidFill>
+                    <a:srgbClr val="000AFF"/>
+                  </a:solidFill>
+                </a:rPr>
+                <a:t>v</a:t>
+              </a:r>
+              <a:r>
+                <a:rPr lang="en-US" altLang="zh-CN" sz="1200" b="1" baseline="-25000" dirty="0">
+                  <a:solidFill>
+                    <a:srgbClr val="000AFF"/>
+                  </a:solidFill>
+                </a:rPr>
+                <a:t>2 </a:t>
+              </a:r>
+              <a:r>
+                <a:rPr lang="en-US" altLang="zh-CN" sz="1200" b="1" dirty="0">
+                  <a:solidFill>
+                    <a:srgbClr val="000AFF"/>
+                  </a:solidFill>
+                </a:rPr>
+                <a:t>v</a:t>
+              </a:r>
+              <a:r>
+                <a:rPr lang="en-US" altLang="zh-CN" sz="1200" b="1" baseline="-25000" dirty="0">
+                  <a:solidFill>
+                    <a:srgbClr val="000AFF"/>
+                  </a:solidFill>
+                </a:rPr>
+                <a:t>4</a:t>
+              </a:r>
+              <a:endParaRPr lang="zh-CN" altLang="en-US" sz="1200" b="1" dirty="0">
+                <a:solidFill>
+                  <a:srgbClr val="000AFF"/>
+                </a:solidFill>
+              </a:endParaRPr>
+            </a:p>
+          </p:txBody>
+        </p:sp>
+        <p:sp>
+          <p:nvSpPr>
+            <p:cNvPr id="18" name="矩形: 圆角 17">
+              <a:extLst>
+                <a:ext uri="{FF2B5EF4-FFF2-40B4-BE49-F238E27FC236}">
+                  <a16:creationId xmlns:a16="http://schemas.microsoft.com/office/drawing/2014/main" id="{225F5D1E-0792-4F24-83FE-4F0D22805686}"/>
+                </a:ext>
+              </a:extLst>
+            </p:cNvPr>
+            <p:cNvSpPr/>
+            <p:nvPr/>
+          </p:nvSpPr>
+          <p:spPr>
+            <a:xfrm>
+              <a:off x="8460000" y="3790000"/>
+              <a:ext cx="648000" cy="389000"/>
+            </a:xfrm>
+            <a:prstGeom prst="roundRect">
+              <a:avLst/>
+            </a:prstGeom>
+            <a:noFill/>
+            <a:ln>
+              <a:solidFill>
+                <a:srgbClr val="B2B3B7"/>
+              </a:solidFill>
+              <a:prstDash val="dash"/>
+            </a:ln>
+          </p:spPr>
+          <p:style>
+            <a:lnRef idx="2">
+              <a:schemeClr val="accent1">
+                <a:shade val="50000"/>
+              </a:schemeClr>
+            </a:lnRef>
+            <a:fillRef idx="1">
+              <a:schemeClr val="accent1"/>
+            </a:fillRef>
+            <a:effectRef idx="0">
+              <a:schemeClr val="accent1"/>
+            </a:effectRef>
+            <a:fontRef idx="minor">
+              <a:schemeClr val="lt1"/>
+            </a:fontRef>
+          </p:style>
+          <p:txBody>
+            <a:bodyPr lIns="72000" tIns="0" rIns="36000" bIns="0" rtlCol="0" anchor="ctr">
+              <a:normAutofit lnSpcReduction="10000"/>
+            </a:bodyPr>
+            <a:lstStyle/>
+            <a:p>
+              <a:r>
+                <a:rPr lang="en-US" altLang="zh-CN" sz="1200" b="1" dirty="0">
+                  <a:solidFill>
+                    <a:srgbClr val="B2B3B7"/>
+                  </a:solidFill>
+                </a:rPr>
+                <a:t>L: u</a:t>
+              </a:r>
+              <a:r>
+                <a:rPr lang="en-US" altLang="zh-CN" sz="1200" b="1" baseline="-25000" dirty="0">
+                  <a:solidFill>
+                    <a:srgbClr val="B2B3B7"/>
+                  </a:solidFill>
+                </a:rPr>
+                <a:t>1 </a:t>
+              </a:r>
+              <a:r>
+                <a:rPr lang="en-US" altLang="zh-CN" sz="1200" b="1" dirty="0">
+                  <a:solidFill>
+                    <a:srgbClr val="B2B3B7"/>
+                  </a:solidFill>
+                </a:rPr>
+                <a:t>u</a:t>
+              </a:r>
+              <a:r>
+                <a:rPr lang="en-US" altLang="zh-CN" sz="1200" b="1" baseline="-25000" dirty="0">
+                  <a:solidFill>
+                    <a:srgbClr val="B2B3B7"/>
+                  </a:solidFill>
+                </a:rPr>
+                <a:t>3</a:t>
+              </a:r>
+              <a:endParaRPr lang="zh-CN" altLang="en-US" sz="1200" b="1" dirty="0">
+                <a:solidFill>
+                  <a:srgbClr val="B2B3B7"/>
+                </a:solidFill>
+              </a:endParaRPr>
+            </a:p>
+            <a:p>
+              <a:r>
+                <a:rPr lang="en-US" altLang="zh-CN" sz="1200" b="1" dirty="0">
+                  <a:solidFill>
+                    <a:srgbClr val="B2B3B7"/>
+                  </a:solidFill>
+                </a:rPr>
+                <a:t>R: </a:t>
+              </a:r>
+              <a:r>
+                <a:rPr lang="en-US" altLang="zh-CN" sz="1200" b="1" dirty="0">
+                  <a:solidFill>
+                    <a:srgbClr val="000AFF"/>
+                  </a:solidFill>
+                </a:rPr>
+                <a:t>v</a:t>
+              </a:r>
+              <a:r>
+                <a:rPr lang="en-US" altLang="zh-CN" sz="1200" b="1" baseline="-25000" dirty="0">
+                  <a:solidFill>
+                    <a:srgbClr val="000AFF"/>
+                  </a:solidFill>
+                </a:rPr>
+                <a:t>3 </a:t>
+              </a:r>
+              <a:r>
+                <a:rPr lang="en-US" altLang="zh-CN" sz="1200" b="1" dirty="0">
+                  <a:solidFill>
+                    <a:srgbClr val="000AFF"/>
+                  </a:solidFill>
+                </a:rPr>
+                <a:t>v</a:t>
+              </a:r>
+              <a:r>
+                <a:rPr lang="en-US" altLang="zh-CN" sz="1200" b="1" baseline="-25000" dirty="0">
+                  <a:solidFill>
+                    <a:srgbClr val="000AFF"/>
+                  </a:solidFill>
+                </a:rPr>
+                <a:t>4</a:t>
+              </a:r>
+              <a:endParaRPr lang="zh-CN" altLang="en-US" sz="1200" b="1" dirty="0">
+                <a:solidFill>
+                  <a:srgbClr val="000AFF"/>
+                </a:solidFill>
+              </a:endParaRPr>
+            </a:p>
+          </p:txBody>
+        </p:sp>
+      </p:grpSp>
+      <p:grpSp>
+        <p:nvGrpSpPr>
+          <p:cNvPr id="19" name="组合 18">
+            <a:extLst>
+              <a:ext uri="{FF2B5EF4-FFF2-40B4-BE49-F238E27FC236}">
+                <a16:creationId xmlns:a16="http://schemas.microsoft.com/office/drawing/2014/main" id="{40E0B69D-A6DA-42F5-986A-B64C5F14B82A}"/>
+              </a:ext>
+            </a:extLst>
+          </p:cNvPr>
+          <p:cNvGrpSpPr/>
+          <p:nvPr/>
+        </p:nvGrpSpPr>
+        <p:grpSpPr>
+          <a:xfrm>
+            <a:off x="2664266" y="4775000"/>
+            <a:ext cx="4409734" cy="389000"/>
+            <a:chOff x="2664266" y="4505000"/>
+            <a:chExt cx="4409734" cy="389000"/>
+          </a:xfrm>
+        </p:grpSpPr>
+        <p:sp>
+          <p:nvSpPr>
+            <p:cNvPr id="20" name="矩形: 圆角 19">
+              <a:extLst>
+                <a:ext uri="{FF2B5EF4-FFF2-40B4-BE49-F238E27FC236}">
+                  <a16:creationId xmlns:a16="http://schemas.microsoft.com/office/drawing/2014/main" id="{7BBB5A71-69F3-47D7-911F-D421792F6F44}"/>
+                </a:ext>
+              </a:extLst>
+            </p:cNvPr>
+            <p:cNvSpPr/>
+            <p:nvPr/>
+          </p:nvSpPr>
+          <p:spPr>
+            <a:xfrm>
+              <a:off x="2664266" y="4505000"/>
+              <a:ext cx="756000" cy="389000"/>
+            </a:xfrm>
+            <a:prstGeom prst="roundRect">
+              <a:avLst/>
+            </a:prstGeom>
+            <a:noFill/>
+            <a:ln>
+              <a:solidFill>
+                <a:srgbClr val="B2B3B7"/>
+              </a:solidFill>
+              <a:prstDash val="dash"/>
+            </a:ln>
+          </p:spPr>
+          <p:style>
+            <a:lnRef idx="2">
+              <a:schemeClr val="accent1">
+                <a:shade val="50000"/>
+              </a:schemeClr>
+            </a:lnRef>
+            <a:fillRef idx="1">
+              <a:schemeClr val="accent1"/>
+            </a:fillRef>
+            <a:effectRef idx="0">
+              <a:schemeClr val="accent1"/>
+            </a:effectRef>
+            <a:fontRef idx="minor">
+              <a:schemeClr val="lt1"/>
+            </a:fontRef>
+          </p:style>
+          <p:txBody>
+            <a:bodyPr lIns="72000" tIns="0" rIns="36000" bIns="0" rtlCol="0" anchor="ctr">
+              <a:normAutofit fontScale="92500"/>
+            </a:bodyPr>
+            <a:lstStyle/>
+            <a:p>
+              <a:r>
+                <a:rPr lang="en-US" altLang="zh-CN" sz="1200" b="1" dirty="0">
+                  <a:solidFill>
+                    <a:srgbClr val="B2B3B7"/>
+                  </a:solidFill>
+                </a:rPr>
+                <a:t>L: u</a:t>
+              </a:r>
+              <a:r>
+                <a:rPr lang="en-US" altLang="zh-CN" sz="1200" b="1" baseline="-25000" dirty="0">
+                  <a:solidFill>
+                    <a:srgbClr val="B2B3B7"/>
+                  </a:solidFill>
+                </a:rPr>
+                <a:t>1</a:t>
+              </a:r>
+              <a:endParaRPr lang="zh-CN" altLang="en-US" sz="1200" b="1" dirty="0">
+                <a:solidFill>
+                  <a:srgbClr val="B2B3B7"/>
+                </a:solidFill>
+              </a:endParaRPr>
+            </a:p>
+            <a:p>
+              <a:r>
+                <a:rPr lang="en-US" altLang="zh-CN" sz="1200" b="1" dirty="0">
+                  <a:solidFill>
+                    <a:srgbClr val="B2B3B7"/>
+                  </a:solidFill>
+                </a:rPr>
+                <a:t>R: </a:t>
+              </a:r>
+              <a:r>
+                <a:rPr lang="en-US" altLang="zh-CN" sz="1200" b="1" dirty="0">
+                  <a:solidFill>
+                    <a:srgbClr val="000AFF"/>
+                  </a:solidFill>
+                </a:rPr>
+                <a:t>v</a:t>
+              </a:r>
+              <a:r>
+                <a:rPr lang="en-US" altLang="zh-CN" sz="1200" b="1" baseline="-25000" dirty="0">
+                  <a:solidFill>
+                    <a:srgbClr val="000AFF"/>
+                  </a:solidFill>
+                </a:rPr>
+                <a:t>1 </a:t>
+              </a:r>
+              <a:r>
+                <a:rPr lang="en-US" altLang="zh-CN" sz="1200" b="1" dirty="0">
+                  <a:solidFill>
+                    <a:srgbClr val="000AFF"/>
+                  </a:solidFill>
+                </a:rPr>
+                <a:t>v</a:t>
+              </a:r>
+              <a:r>
+                <a:rPr lang="en-US" altLang="zh-CN" sz="1200" b="1" baseline="-25000" dirty="0">
+                  <a:solidFill>
+                    <a:srgbClr val="000AFF"/>
+                  </a:solidFill>
+                </a:rPr>
+                <a:t>2 </a:t>
+              </a:r>
+              <a:r>
+                <a:rPr lang="en-US" altLang="zh-CN" sz="1200" b="1" dirty="0">
+                  <a:solidFill>
+                    <a:srgbClr val="000AFF"/>
+                  </a:solidFill>
+                </a:rPr>
+                <a:t>v</a:t>
+              </a:r>
+              <a:r>
+                <a:rPr lang="en-US" altLang="zh-CN" sz="1200" b="1" baseline="-25000" dirty="0">
+                  <a:solidFill>
+                    <a:srgbClr val="000AFF"/>
+                  </a:solidFill>
+                </a:rPr>
+                <a:t>3</a:t>
+              </a:r>
+              <a:endParaRPr lang="zh-CN" altLang="en-US" sz="1200" b="1" dirty="0">
+                <a:solidFill>
+                  <a:srgbClr val="000AFF"/>
+                </a:solidFill>
+              </a:endParaRPr>
+            </a:p>
+          </p:txBody>
+        </p:sp>
+        <p:sp>
+          <p:nvSpPr>
+            <p:cNvPr id="21" name="矩形: 圆角 20">
+              <a:extLst>
+                <a:ext uri="{FF2B5EF4-FFF2-40B4-BE49-F238E27FC236}">
+                  <a16:creationId xmlns:a16="http://schemas.microsoft.com/office/drawing/2014/main" id="{4286EE16-A507-43DE-9E1F-E333A901F23F}"/>
+                </a:ext>
+              </a:extLst>
+            </p:cNvPr>
+            <p:cNvSpPr/>
+            <p:nvPr/>
+          </p:nvSpPr>
+          <p:spPr>
+            <a:xfrm>
+              <a:off x="3708266" y="4505000"/>
+              <a:ext cx="756000" cy="389000"/>
+            </a:xfrm>
+            <a:prstGeom prst="roundRect">
+              <a:avLst/>
+            </a:prstGeom>
+            <a:noFill/>
+            <a:ln>
+              <a:solidFill>
+                <a:srgbClr val="B2B3B7"/>
+              </a:solidFill>
+              <a:prstDash val="dash"/>
+            </a:ln>
+          </p:spPr>
+          <p:style>
+            <a:lnRef idx="2">
+              <a:schemeClr val="accent1">
+                <a:shade val="50000"/>
+              </a:schemeClr>
+            </a:lnRef>
+            <a:fillRef idx="1">
+              <a:schemeClr val="accent1"/>
+            </a:fillRef>
+            <a:effectRef idx="0">
+              <a:schemeClr val="accent1"/>
+            </a:effectRef>
+            <a:fontRef idx="minor">
+              <a:schemeClr val="lt1"/>
+            </a:fontRef>
+          </p:style>
+          <p:txBody>
+            <a:bodyPr lIns="72000" tIns="0" rIns="36000" bIns="0" rtlCol="0" anchor="ctr">
+              <a:normAutofit fontScale="92500"/>
+            </a:bodyPr>
+            <a:lstStyle/>
+            <a:p>
+              <a:r>
+                <a:rPr lang="en-US" altLang="zh-CN" sz="1200" b="1" dirty="0">
+                  <a:solidFill>
+                    <a:srgbClr val="B2B3B7"/>
+                  </a:solidFill>
+                </a:rPr>
+                <a:t>L: u</a:t>
+              </a:r>
+              <a:r>
+                <a:rPr lang="en-US" altLang="zh-CN" sz="1200" b="1" baseline="-25000" dirty="0">
+                  <a:solidFill>
+                    <a:srgbClr val="B2B3B7"/>
+                  </a:solidFill>
+                </a:rPr>
+                <a:t>1</a:t>
+              </a:r>
+              <a:endParaRPr lang="zh-CN" altLang="en-US" sz="1200" b="1" dirty="0">
+                <a:solidFill>
+                  <a:srgbClr val="B2B3B7"/>
+                </a:solidFill>
+              </a:endParaRPr>
+            </a:p>
+            <a:p>
+              <a:r>
+                <a:rPr lang="en-US" altLang="zh-CN" sz="1200" b="1" dirty="0">
+                  <a:solidFill>
+                    <a:srgbClr val="B2B3B7"/>
+                  </a:solidFill>
+                </a:rPr>
+                <a:t>R: </a:t>
+              </a:r>
+              <a:r>
+                <a:rPr lang="en-US" altLang="zh-CN" sz="1200" b="1" dirty="0">
+                  <a:solidFill>
+                    <a:srgbClr val="000AFF"/>
+                  </a:solidFill>
+                </a:rPr>
+                <a:t>v</a:t>
+              </a:r>
+              <a:r>
+                <a:rPr lang="en-US" altLang="zh-CN" sz="1200" b="1" baseline="-25000" dirty="0">
+                  <a:solidFill>
+                    <a:srgbClr val="000AFF"/>
+                  </a:solidFill>
+                </a:rPr>
+                <a:t>1 </a:t>
+              </a:r>
+              <a:r>
+                <a:rPr lang="en-US" altLang="zh-CN" sz="1200" b="1" dirty="0">
+                  <a:solidFill>
+                    <a:srgbClr val="000AFF"/>
+                  </a:solidFill>
+                </a:rPr>
+                <a:t>v</a:t>
+              </a:r>
+              <a:r>
+                <a:rPr lang="en-US" altLang="zh-CN" sz="1200" b="1" baseline="-25000" dirty="0">
+                  <a:solidFill>
+                    <a:srgbClr val="000AFF"/>
+                  </a:solidFill>
+                </a:rPr>
+                <a:t>2 </a:t>
+              </a:r>
+              <a:r>
+                <a:rPr lang="en-US" altLang="zh-CN" sz="1200" b="1" dirty="0">
+                  <a:solidFill>
+                    <a:srgbClr val="000AFF"/>
+                  </a:solidFill>
+                </a:rPr>
+                <a:t>v</a:t>
+              </a:r>
+              <a:r>
+                <a:rPr lang="en-US" altLang="zh-CN" sz="1200" b="1" baseline="-25000" dirty="0">
+                  <a:solidFill>
+                    <a:srgbClr val="000AFF"/>
+                  </a:solidFill>
+                </a:rPr>
+                <a:t>4</a:t>
+              </a:r>
+              <a:endParaRPr lang="zh-CN" altLang="en-US" sz="1200" b="1" dirty="0">
+                <a:solidFill>
+                  <a:srgbClr val="000AFF"/>
+                </a:solidFill>
+              </a:endParaRPr>
+            </a:p>
+          </p:txBody>
+        </p:sp>
+        <p:sp>
+          <p:nvSpPr>
+            <p:cNvPr id="22" name="矩形: 圆角 21">
+              <a:extLst>
+                <a:ext uri="{FF2B5EF4-FFF2-40B4-BE49-F238E27FC236}">
+                  <a16:creationId xmlns:a16="http://schemas.microsoft.com/office/drawing/2014/main" id="{5A382976-BECF-44EC-A14E-6340FE0D76C3}"/>
+                </a:ext>
+              </a:extLst>
+            </p:cNvPr>
+            <p:cNvSpPr/>
+            <p:nvPr/>
+          </p:nvSpPr>
+          <p:spPr>
+            <a:xfrm>
+              <a:off x="4752266" y="4505000"/>
+              <a:ext cx="756000" cy="389000"/>
+            </a:xfrm>
+            <a:prstGeom prst="roundRect">
+              <a:avLst/>
+            </a:prstGeom>
+            <a:noFill/>
+            <a:ln>
+              <a:solidFill>
+                <a:srgbClr val="B2B3B7"/>
+              </a:solidFill>
+              <a:prstDash val="dash"/>
+            </a:ln>
+          </p:spPr>
+          <p:style>
+            <a:lnRef idx="2">
+              <a:schemeClr val="accent1">
+                <a:shade val="50000"/>
+              </a:schemeClr>
+            </a:lnRef>
+            <a:fillRef idx="1">
+              <a:schemeClr val="accent1"/>
+            </a:fillRef>
+            <a:effectRef idx="0">
+              <a:schemeClr val="accent1"/>
+            </a:effectRef>
+            <a:fontRef idx="minor">
+              <a:schemeClr val="lt1"/>
+            </a:fontRef>
+          </p:style>
+          <p:txBody>
+            <a:bodyPr lIns="72000" tIns="0" rIns="36000" bIns="0" rtlCol="0" anchor="ctr">
+              <a:normAutofit fontScale="92500"/>
+            </a:bodyPr>
+            <a:lstStyle/>
+            <a:p>
+              <a:r>
+                <a:rPr lang="en-US" altLang="zh-CN" sz="1200" b="1" dirty="0">
+                  <a:solidFill>
+                    <a:srgbClr val="B2B3B7"/>
+                  </a:solidFill>
+                </a:rPr>
+                <a:t>L: u</a:t>
+              </a:r>
+              <a:r>
+                <a:rPr lang="en-US" altLang="zh-CN" sz="1200" b="1" baseline="-25000" dirty="0">
+                  <a:solidFill>
+                    <a:srgbClr val="B2B3B7"/>
+                  </a:solidFill>
+                </a:rPr>
+                <a:t>1</a:t>
+              </a:r>
+              <a:endParaRPr lang="zh-CN" altLang="en-US" sz="1200" b="1" dirty="0">
+                <a:solidFill>
+                  <a:srgbClr val="B2B3B7"/>
+                </a:solidFill>
+              </a:endParaRPr>
+            </a:p>
+            <a:p>
+              <a:r>
+                <a:rPr lang="en-US" altLang="zh-CN" sz="1200" b="1" dirty="0">
+                  <a:solidFill>
+                    <a:srgbClr val="B2B3B7"/>
+                  </a:solidFill>
+                </a:rPr>
+                <a:t>R: </a:t>
+              </a:r>
+              <a:r>
+                <a:rPr lang="en-US" altLang="zh-CN" sz="1200" b="1" dirty="0">
+                  <a:solidFill>
+                    <a:srgbClr val="000AFF"/>
+                  </a:solidFill>
+                </a:rPr>
+                <a:t>v</a:t>
+              </a:r>
+              <a:r>
+                <a:rPr lang="en-US" altLang="zh-CN" sz="1200" b="1" baseline="-25000" dirty="0">
+                  <a:solidFill>
+                    <a:srgbClr val="000AFF"/>
+                  </a:solidFill>
+                </a:rPr>
+                <a:t>1 </a:t>
+              </a:r>
+              <a:r>
+                <a:rPr lang="en-US" altLang="zh-CN" sz="1200" b="1" dirty="0">
+                  <a:solidFill>
+                    <a:srgbClr val="000AFF"/>
+                  </a:solidFill>
+                </a:rPr>
+                <a:t>v</a:t>
+              </a:r>
+              <a:r>
+                <a:rPr lang="en-US" altLang="zh-CN" sz="1200" b="1" baseline="-25000" dirty="0">
+                  <a:solidFill>
+                    <a:srgbClr val="000AFF"/>
+                  </a:solidFill>
+                </a:rPr>
+                <a:t>3 </a:t>
+              </a:r>
+              <a:r>
+                <a:rPr lang="en-US" altLang="zh-CN" sz="1200" b="1" dirty="0">
+                  <a:solidFill>
+                    <a:srgbClr val="000AFF"/>
+                  </a:solidFill>
+                </a:rPr>
+                <a:t>v</a:t>
+              </a:r>
+              <a:r>
+                <a:rPr lang="en-US" altLang="zh-CN" sz="1200" b="1" baseline="-25000" dirty="0">
+                  <a:solidFill>
+                    <a:srgbClr val="000AFF"/>
+                  </a:solidFill>
+                </a:rPr>
+                <a:t>4</a:t>
+              </a:r>
+              <a:endParaRPr lang="zh-CN" altLang="en-US" sz="1200" b="1" dirty="0">
+                <a:solidFill>
+                  <a:srgbClr val="000AFF"/>
+                </a:solidFill>
+              </a:endParaRPr>
+            </a:p>
+          </p:txBody>
+        </p:sp>
+        <p:sp>
+          <p:nvSpPr>
+            <p:cNvPr id="23" name="矩形: 圆角 22">
+              <a:extLst>
+                <a:ext uri="{FF2B5EF4-FFF2-40B4-BE49-F238E27FC236}">
+                  <a16:creationId xmlns:a16="http://schemas.microsoft.com/office/drawing/2014/main" id="{AD2406EF-51C7-448E-ACA5-6F1F75416440}"/>
+                </a:ext>
+              </a:extLst>
+            </p:cNvPr>
+            <p:cNvSpPr/>
+            <p:nvPr/>
+          </p:nvSpPr>
+          <p:spPr>
+            <a:xfrm>
+              <a:off x="6318000" y="4505000"/>
+              <a:ext cx="756000" cy="389000"/>
+            </a:xfrm>
+            <a:prstGeom prst="roundRect">
+              <a:avLst/>
+            </a:prstGeom>
+            <a:noFill/>
+            <a:ln w="28575">
+              <a:solidFill>
+                <a:schemeClr val="tx1"/>
+              </a:solidFill>
+            </a:ln>
+          </p:spPr>
+          <p:style>
+            <a:lnRef idx="2">
+              <a:schemeClr val="accent1">
+                <a:shade val="50000"/>
+              </a:schemeClr>
+            </a:lnRef>
+            <a:fillRef idx="1">
+              <a:schemeClr val="accent1"/>
+            </a:fillRef>
+            <a:effectRef idx="0">
+              <a:schemeClr val="accent1"/>
+            </a:effectRef>
+            <a:fontRef idx="minor">
+              <a:schemeClr val="lt1"/>
+            </a:fontRef>
+          </p:style>
+          <p:txBody>
+            <a:bodyPr lIns="72000" tIns="0" rIns="36000" bIns="0" rtlCol="0" anchor="ctr">
+              <a:normAutofit fontScale="92500"/>
+            </a:bodyPr>
+            <a:lstStyle/>
+            <a:p>
+              <a:r>
+                <a:rPr lang="en-US" altLang="zh-CN" sz="1200" b="1" dirty="0">
+                  <a:solidFill>
+                    <a:srgbClr val="B2B3B7"/>
+                  </a:solidFill>
+                </a:rPr>
+                <a:t>L: u</a:t>
+              </a:r>
+              <a:r>
+                <a:rPr lang="en-US" altLang="zh-CN" sz="1200" b="1" baseline="-25000" dirty="0">
+                  <a:solidFill>
+                    <a:srgbClr val="B2B3B7"/>
+                  </a:solidFill>
+                </a:rPr>
+                <a:t>1</a:t>
+              </a:r>
+              <a:r>
+                <a:rPr lang="en-US" altLang="zh-CN" sz="1200" b="1" dirty="0">
+                  <a:solidFill>
+                    <a:srgbClr val="B2B3B7"/>
+                  </a:solidFill>
+                </a:rPr>
+                <a:t> u</a:t>
+              </a:r>
+              <a:r>
+                <a:rPr lang="en-US" altLang="zh-CN" sz="1200" b="1" baseline="-25000" dirty="0">
+                  <a:solidFill>
+                    <a:srgbClr val="B2B3B7"/>
+                  </a:solidFill>
+                </a:rPr>
+                <a:t>3</a:t>
+              </a:r>
+              <a:endParaRPr lang="zh-CN" altLang="en-US" sz="1200" b="1" dirty="0">
+                <a:solidFill>
+                  <a:srgbClr val="B2B3B7"/>
+                </a:solidFill>
+              </a:endParaRPr>
+            </a:p>
+            <a:p>
+              <a:r>
+                <a:rPr lang="en-US" altLang="zh-CN" sz="1200" b="1" dirty="0">
+                  <a:solidFill>
+                    <a:srgbClr val="B2B3B7"/>
+                  </a:solidFill>
+                </a:rPr>
+                <a:t>R: </a:t>
+              </a:r>
+              <a:r>
+                <a:rPr lang="en-US" altLang="zh-CN" sz="1200" b="1" dirty="0">
+                  <a:solidFill>
+                    <a:srgbClr val="000AFF"/>
+                  </a:solidFill>
+                </a:rPr>
+                <a:t>v</a:t>
+              </a:r>
+              <a:r>
+                <a:rPr lang="en-US" altLang="zh-CN" sz="1200" b="1" baseline="-25000" dirty="0">
+                  <a:solidFill>
+                    <a:srgbClr val="000AFF"/>
+                  </a:solidFill>
+                </a:rPr>
+                <a:t>2 </a:t>
+              </a:r>
+              <a:r>
+                <a:rPr lang="en-US" altLang="zh-CN" sz="1200" b="1" dirty="0">
+                  <a:solidFill>
+                    <a:srgbClr val="000AFF"/>
+                  </a:solidFill>
+                </a:rPr>
+                <a:t>v</a:t>
+              </a:r>
+              <a:r>
+                <a:rPr lang="en-US" altLang="zh-CN" sz="1200" b="1" baseline="-25000" dirty="0">
+                  <a:solidFill>
+                    <a:srgbClr val="000AFF"/>
+                  </a:solidFill>
+                </a:rPr>
+                <a:t>3 </a:t>
+              </a:r>
+              <a:r>
+                <a:rPr lang="en-US" altLang="zh-CN" sz="1200" b="1" dirty="0">
+                  <a:solidFill>
+                    <a:srgbClr val="000AFF"/>
+                  </a:solidFill>
+                </a:rPr>
+                <a:t>v</a:t>
+              </a:r>
+              <a:r>
+                <a:rPr lang="en-US" altLang="zh-CN" sz="1200" b="1" baseline="-25000" dirty="0">
+                  <a:solidFill>
+                    <a:srgbClr val="000AFF"/>
+                  </a:solidFill>
+                </a:rPr>
+                <a:t>4</a:t>
+              </a:r>
+              <a:endParaRPr lang="zh-CN" altLang="en-US" sz="1200" b="1" dirty="0">
+                <a:solidFill>
+                  <a:srgbClr val="000AFF"/>
+                </a:solidFill>
+              </a:endParaRPr>
+            </a:p>
+          </p:txBody>
+        </p:sp>
+      </p:grpSp>
+      <p:sp>
+        <p:nvSpPr>
+          <p:cNvPr id="24" name="矩形: 圆角 23">
+            <a:extLst>
+              <a:ext uri="{FF2B5EF4-FFF2-40B4-BE49-F238E27FC236}">
+                <a16:creationId xmlns:a16="http://schemas.microsoft.com/office/drawing/2014/main" id="{B4692BC1-9545-4294-9F18-80DAFA8CB2D2}"/>
+              </a:ext>
+            </a:extLst>
+          </p:cNvPr>
+          <p:cNvSpPr/>
+          <p:nvPr/>
+        </p:nvSpPr>
+        <p:spPr>
+          <a:xfrm>
+            <a:off x="2610266" y="5580000"/>
+            <a:ext cx="864000" cy="389000"/>
+          </a:xfrm>
+          <a:prstGeom prst="roundRect">
+            <a:avLst/>
+          </a:prstGeom>
+          <a:noFill/>
+          <a:ln w="28575">
+            <a:solidFill>
+              <a:schemeClr val="tx1"/>
+            </a:solidFill>
+          </a:ln>
+        </p:spPr>
+        <p:style>
+          <a:lnRef idx="2">
+            <a:schemeClr val="accent1">
+              <a:shade val="50000"/>
+            </a:schemeClr>
+          </a:lnRef>
+          <a:fillRef idx="1">
+            <a:schemeClr val="accent1"/>
+          </a:fillRef>
+          <a:effectRef idx="0">
+            <a:schemeClr val="accent1"/>
+          </a:effectRef>
+          <a:fontRef idx="minor">
+            <a:schemeClr val="lt1"/>
+          </a:fontRef>
+        </p:style>
+        <p:txBody>
+          <a:bodyPr lIns="72000" tIns="0" rIns="36000" bIns="0" rtlCol="0" anchor="ctr">
+            <a:normAutofit fontScale="85000" lnSpcReduction="10000"/>
+          </a:bodyPr>
+          <a:lstStyle/>
+          <a:p>
+            <a:r>
+              <a:rPr lang="en-US" altLang="zh-CN" sz="1200" b="1" dirty="0">
+                <a:solidFill>
+                  <a:srgbClr val="B2B3B7"/>
+                </a:solidFill>
+              </a:rPr>
+              <a:t>L: u</a:t>
+            </a:r>
+            <a:r>
+              <a:rPr lang="en-US" altLang="zh-CN" sz="1200" b="1" baseline="-25000" dirty="0">
+                <a:solidFill>
+                  <a:srgbClr val="B2B3B7"/>
+                </a:solidFill>
+              </a:rPr>
+              <a:t>1</a:t>
+            </a:r>
+            <a:endParaRPr lang="zh-CN" altLang="en-US" sz="1200" b="1" dirty="0">
+              <a:solidFill>
+                <a:srgbClr val="B2B3B7"/>
+              </a:solidFill>
+            </a:endParaRPr>
+          </a:p>
+          <a:p>
+            <a:r>
+              <a:rPr lang="en-US" altLang="zh-CN" sz="1200" b="1" dirty="0">
+                <a:solidFill>
+                  <a:srgbClr val="B2B3B7"/>
+                </a:solidFill>
+              </a:rPr>
+              <a:t>R: </a:t>
+            </a:r>
+            <a:r>
+              <a:rPr lang="en-US" altLang="zh-CN" sz="1200" b="1" dirty="0">
+                <a:solidFill>
+                  <a:srgbClr val="000AFF"/>
+                </a:solidFill>
+              </a:rPr>
+              <a:t>v</a:t>
+            </a:r>
+            <a:r>
+              <a:rPr lang="en-US" altLang="zh-CN" sz="1200" b="1" baseline="-25000" dirty="0">
+                <a:solidFill>
+                  <a:srgbClr val="000AFF"/>
+                </a:solidFill>
+              </a:rPr>
+              <a:t>1 </a:t>
+            </a:r>
+            <a:r>
+              <a:rPr lang="en-US" altLang="zh-CN" sz="1200" b="1" dirty="0">
+                <a:solidFill>
+                  <a:srgbClr val="000AFF"/>
+                </a:solidFill>
+              </a:rPr>
+              <a:t>v</a:t>
+            </a:r>
+            <a:r>
+              <a:rPr lang="en-US" altLang="zh-CN" sz="1200" b="1" baseline="-25000" dirty="0">
+                <a:solidFill>
+                  <a:srgbClr val="000AFF"/>
+                </a:solidFill>
+              </a:rPr>
+              <a:t>2 </a:t>
+            </a:r>
+            <a:r>
+              <a:rPr lang="en-US" altLang="zh-CN" sz="1200" b="1" dirty="0">
+                <a:solidFill>
+                  <a:srgbClr val="000AFF"/>
+                </a:solidFill>
+              </a:rPr>
+              <a:t>v</a:t>
+            </a:r>
+            <a:r>
+              <a:rPr lang="en-US" altLang="zh-CN" sz="1200" b="1" baseline="-25000" dirty="0">
+                <a:solidFill>
+                  <a:srgbClr val="000AFF"/>
+                </a:solidFill>
+              </a:rPr>
+              <a:t>3 </a:t>
+            </a:r>
+            <a:r>
+              <a:rPr lang="en-US" altLang="zh-CN" sz="1200" b="1" dirty="0">
+                <a:solidFill>
+                  <a:srgbClr val="000AFF"/>
+                </a:solidFill>
+              </a:rPr>
+              <a:t>v</a:t>
+            </a:r>
+            <a:r>
+              <a:rPr lang="en-US" altLang="zh-CN" sz="1200" b="1" baseline="-25000" dirty="0">
+                <a:solidFill>
+                  <a:srgbClr val="000AFF"/>
+                </a:solidFill>
+              </a:rPr>
+              <a:t>4</a:t>
+            </a:r>
+            <a:endParaRPr lang="zh-CN" altLang="en-US" sz="1200" b="1" dirty="0">
+              <a:solidFill>
+                <a:srgbClr val="000AFF"/>
+              </a:solidFill>
+            </a:endParaRPr>
+          </a:p>
+        </p:txBody>
+      </p:sp>
+      <p:cxnSp>
+        <p:nvCxnSpPr>
+          <p:cNvPr id="25" name="直接连接符 24">
+            <a:extLst>
+              <a:ext uri="{FF2B5EF4-FFF2-40B4-BE49-F238E27FC236}">
+                <a16:creationId xmlns:a16="http://schemas.microsoft.com/office/drawing/2014/main" id="{2F69678D-D127-4AB5-8AC4-D74898244F00}"/>
+              </a:ext>
+            </a:extLst>
+          </p:cNvPr>
+          <p:cNvCxnSpPr>
+            <a:stCxn id="2" idx="2"/>
+            <a:endCxn id="8" idx="0"/>
+          </p:cNvCxnSpPr>
+          <p:nvPr/>
+        </p:nvCxnSpPr>
+        <p:spPr>
+          <a:xfrm flipH="1">
+            <a:off x="4608000" y="2729000"/>
+            <a:ext cx="1944266" cy="416000"/>
+          </a:xfrm>
+          <a:prstGeom prst="line">
+            <a:avLst/>
+          </a:prstGeom>
+        </p:spPr>
+        <p:style>
+          <a:lnRef idx="1">
+            <a:schemeClr val="dk1"/>
+          </a:lnRef>
+          <a:fillRef idx="0">
+            <a:schemeClr val="dk1"/>
+          </a:fillRef>
+          <a:effectRef idx="0">
+            <a:schemeClr val="dk1"/>
+          </a:effectRef>
+          <a:fontRef idx="minor">
+            <a:schemeClr val="tx1"/>
+          </a:fontRef>
+        </p:style>
+      </p:cxnSp>
+      <p:cxnSp>
+        <p:nvCxnSpPr>
+          <p:cNvPr id="26" name="直接连接符 25">
+            <a:extLst>
+              <a:ext uri="{FF2B5EF4-FFF2-40B4-BE49-F238E27FC236}">
+                <a16:creationId xmlns:a16="http://schemas.microsoft.com/office/drawing/2014/main" id="{9E2B688F-CC99-4985-81CB-E16CAB8BA9C0}"/>
+              </a:ext>
+            </a:extLst>
+          </p:cNvPr>
+          <p:cNvCxnSpPr>
+            <a:cxnSpLocks/>
+            <a:stCxn id="2" idx="2"/>
+            <a:endCxn id="9" idx="0"/>
+          </p:cNvCxnSpPr>
+          <p:nvPr/>
+        </p:nvCxnSpPr>
+        <p:spPr>
+          <a:xfrm flipH="1">
+            <a:off x="5909689" y="2729000"/>
+            <a:ext cx="642577" cy="436000"/>
+          </a:xfrm>
+          <a:prstGeom prst="line">
+            <a:avLst/>
+          </a:prstGeom>
+        </p:spPr>
+        <p:style>
+          <a:lnRef idx="1">
+            <a:schemeClr val="dk1"/>
+          </a:lnRef>
+          <a:fillRef idx="0">
+            <a:schemeClr val="dk1"/>
+          </a:fillRef>
+          <a:effectRef idx="0">
+            <a:schemeClr val="dk1"/>
+          </a:effectRef>
+          <a:fontRef idx="minor">
+            <a:schemeClr val="tx1"/>
+          </a:fontRef>
+        </p:style>
+      </p:cxnSp>
+      <p:cxnSp>
+        <p:nvCxnSpPr>
+          <p:cNvPr id="27" name="直接连接符 26">
+            <a:extLst>
+              <a:ext uri="{FF2B5EF4-FFF2-40B4-BE49-F238E27FC236}">
+                <a16:creationId xmlns:a16="http://schemas.microsoft.com/office/drawing/2014/main" id="{F3514CDE-AF3D-4C9B-951E-09FFF6A62520}"/>
+              </a:ext>
+            </a:extLst>
+          </p:cNvPr>
+          <p:cNvCxnSpPr>
+            <a:cxnSpLocks/>
+            <a:stCxn id="2" idx="2"/>
+            <a:endCxn id="10" idx="0"/>
+          </p:cNvCxnSpPr>
+          <p:nvPr/>
+        </p:nvCxnSpPr>
+        <p:spPr>
+          <a:xfrm>
+            <a:off x="6552266" y="2729000"/>
+            <a:ext cx="659112" cy="416000"/>
+          </a:xfrm>
+          <a:prstGeom prst="line">
+            <a:avLst/>
+          </a:prstGeom>
+        </p:spPr>
+        <p:style>
+          <a:lnRef idx="1">
+            <a:schemeClr val="dk1"/>
+          </a:lnRef>
+          <a:fillRef idx="0">
+            <a:schemeClr val="dk1"/>
+          </a:fillRef>
+          <a:effectRef idx="0">
+            <a:schemeClr val="dk1"/>
+          </a:effectRef>
+          <a:fontRef idx="minor">
+            <a:schemeClr val="tx1"/>
+          </a:fontRef>
+        </p:style>
+      </p:cxnSp>
+      <p:cxnSp>
+        <p:nvCxnSpPr>
+          <p:cNvPr id="28" name="直接连接符 27">
+            <a:extLst>
+              <a:ext uri="{FF2B5EF4-FFF2-40B4-BE49-F238E27FC236}">
+                <a16:creationId xmlns:a16="http://schemas.microsoft.com/office/drawing/2014/main" id="{3A91B4B0-4C2F-4537-98F2-E257943EA3F2}"/>
+              </a:ext>
+            </a:extLst>
+          </p:cNvPr>
+          <p:cNvCxnSpPr>
+            <a:cxnSpLocks/>
+            <a:stCxn id="2" idx="2"/>
+            <a:endCxn id="11" idx="0"/>
+          </p:cNvCxnSpPr>
+          <p:nvPr/>
+        </p:nvCxnSpPr>
+        <p:spPr>
+          <a:xfrm>
+            <a:off x="6552266" y="2729000"/>
+            <a:ext cx="1960801" cy="416000"/>
+          </a:xfrm>
+          <a:prstGeom prst="line">
+            <a:avLst/>
+          </a:prstGeom>
+        </p:spPr>
+        <p:style>
+          <a:lnRef idx="1">
+            <a:schemeClr val="dk1"/>
+          </a:lnRef>
+          <a:fillRef idx="0">
+            <a:schemeClr val="dk1"/>
+          </a:fillRef>
+          <a:effectRef idx="0">
+            <a:schemeClr val="dk1"/>
+          </a:effectRef>
+          <a:fontRef idx="minor">
+            <a:schemeClr val="tx1"/>
+          </a:fontRef>
+        </p:style>
+      </p:cxnSp>
+      <p:cxnSp>
+        <p:nvCxnSpPr>
+          <p:cNvPr id="29" name="直接连接符 28">
+            <a:extLst>
+              <a:ext uri="{FF2B5EF4-FFF2-40B4-BE49-F238E27FC236}">
+                <a16:creationId xmlns:a16="http://schemas.microsoft.com/office/drawing/2014/main" id="{AC21A813-6E65-4BE1-89E3-18830735934A}"/>
+              </a:ext>
+            </a:extLst>
+          </p:cNvPr>
+          <p:cNvCxnSpPr>
+            <a:cxnSpLocks/>
+            <a:stCxn id="8" idx="2"/>
+            <a:endCxn id="13" idx="0"/>
+          </p:cNvCxnSpPr>
+          <p:nvPr/>
+        </p:nvCxnSpPr>
+        <p:spPr>
+          <a:xfrm flipH="1">
+            <a:off x="3564000" y="3534000"/>
+            <a:ext cx="1044000" cy="436000"/>
+          </a:xfrm>
+          <a:prstGeom prst="line">
+            <a:avLst/>
+          </a:prstGeom>
+        </p:spPr>
+        <p:style>
+          <a:lnRef idx="1">
+            <a:schemeClr val="dk1"/>
+          </a:lnRef>
+          <a:fillRef idx="0">
+            <a:schemeClr val="dk1"/>
+          </a:fillRef>
+          <a:effectRef idx="0">
+            <a:schemeClr val="dk1"/>
+          </a:effectRef>
+          <a:fontRef idx="minor">
+            <a:schemeClr val="tx1"/>
+          </a:fontRef>
+        </p:style>
+      </p:cxnSp>
+      <p:cxnSp>
+        <p:nvCxnSpPr>
+          <p:cNvPr id="30" name="直接连接符 29">
+            <a:extLst>
+              <a:ext uri="{FF2B5EF4-FFF2-40B4-BE49-F238E27FC236}">
+                <a16:creationId xmlns:a16="http://schemas.microsoft.com/office/drawing/2014/main" id="{91DBEAB7-D444-417B-8815-48B08283A5CA}"/>
+              </a:ext>
+            </a:extLst>
+          </p:cNvPr>
+          <p:cNvCxnSpPr>
+            <a:cxnSpLocks/>
+            <a:stCxn id="8" idx="2"/>
+            <a:endCxn id="14" idx="0"/>
+          </p:cNvCxnSpPr>
+          <p:nvPr/>
+        </p:nvCxnSpPr>
+        <p:spPr>
+          <a:xfrm>
+            <a:off x="4608000" y="3534000"/>
+            <a:ext cx="0" cy="436000"/>
+          </a:xfrm>
+          <a:prstGeom prst="line">
+            <a:avLst/>
+          </a:prstGeom>
+        </p:spPr>
+        <p:style>
+          <a:lnRef idx="1">
+            <a:schemeClr val="dk1"/>
+          </a:lnRef>
+          <a:fillRef idx="0">
+            <a:schemeClr val="dk1"/>
+          </a:fillRef>
+          <a:effectRef idx="0">
+            <a:schemeClr val="dk1"/>
+          </a:effectRef>
+          <a:fontRef idx="minor">
+            <a:schemeClr val="tx1"/>
+          </a:fontRef>
+        </p:style>
+      </p:cxnSp>
+      <p:cxnSp>
+        <p:nvCxnSpPr>
+          <p:cNvPr id="31" name="直接连接符 30">
+            <a:extLst>
+              <a:ext uri="{FF2B5EF4-FFF2-40B4-BE49-F238E27FC236}">
+                <a16:creationId xmlns:a16="http://schemas.microsoft.com/office/drawing/2014/main" id="{E8F3B2EE-6268-4470-8A5C-23373A08FCB6}"/>
+              </a:ext>
+            </a:extLst>
+          </p:cNvPr>
+          <p:cNvCxnSpPr>
+            <a:cxnSpLocks/>
+            <a:stCxn id="8" idx="2"/>
+            <a:endCxn id="15" idx="0"/>
+          </p:cNvCxnSpPr>
+          <p:nvPr/>
+        </p:nvCxnSpPr>
+        <p:spPr>
+          <a:xfrm>
+            <a:off x="4608000" y="3534000"/>
+            <a:ext cx="1044000" cy="436000"/>
+          </a:xfrm>
+          <a:prstGeom prst="line">
+            <a:avLst/>
+          </a:prstGeom>
+        </p:spPr>
+        <p:style>
+          <a:lnRef idx="1">
+            <a:schemeClr val="dk1"/>
+          </a:lnRef>
+          <a:fillRef idx="0">
+            <a:schemeClr val="dk1"/>
+          </a:fillRef>
+          <a:effectRef idx="0">
+            <a:schemeClr val="dk1"/>
+          </a:effectRef>
+          <a:fontRef idx="minor">
+            <a:schemeClr val="tx1"/>
+          </a:fontRef>
+        </p:style>
+      </p:cxnSp>
+      <p:cxnSp>
+        <p:nvCxnSpPr>
+          <p:cNvPr id="32" name="直接连接符 31">
+            <a:extLst>
+              <a:ext uri="{FF2B5EF4-FFF2-40B4-BE49-F238E27FC236}">
+                <a16:creationId xmlns:a16="http://schemas.microsoft.com/office/drawing/2014/main" id="{FC3F7810-5DC6-41DF-A45A-EDD67B5E94E4}"/>
+              </a:ext>
+            </a:extLst>
+          </p:cNvPr>
+          <p:cNvCxnSpPr>
+            <a:cxnSpLocks/>
+            <a:stCxn id="9" idx="2"/>
+            <a:endCxn id="16" idx="0"/>
+          </p:cNvCxnSpPr>
+          <p:nvPr/>
+        </p:nvCxnSpPr>
+        <p:spPr>
+          <a:xfrm>
+            <a:off x="5909689" y="3554000"/>
+            <a:ext cx="786311" cy="416000"/>
+          </a:xfrm>
+          <a:prstGeom prst="line">
+            <a:avLst/>
+          </a:prstGeom>
+        </p:spPr>
+        <p:style>
+          <a:lnRef idx="1">
+            <a:schemeClr val="dk1"/>
+          </a:lnRef>
+          <a:fillRef idx="0">
+            <a:schemeClr val="dk1"/>
+          </a:fillRef>
+          <a:effectRef idx="0">
+            <a:schemeClr val="dk1"/>
+          </a:effectRef>
+          <a:fontRef idx="minor">
+            <a:schemeClr val="tx1"/>
+          </a:fontRef>
+        </p:style>
+      </p:cxnSp>
+      <p:cxnSp>
+        <p:nvCxnSpPr>
+          <p:cNvPr id="33" name="直接连接符 32">
+            <a:extLst>
+              <a:ext uri="{FF2B5EF4-FFF2-40B4-BE49-F238E27FC236}">
+                <a16:creationId xmlns:a16="http://schemas.microsoft.com/office/drawing/2014/main" id="{3CE61706-3EED-46D8-BF5E-D718CAAA86B0}"/>
+              </a:ext>
+            </a:extLst>
+          </p:cNvPr>
+          <p:cNvCxnSpPr>
+            <a:cxnSpLocks/>
+            <a:stCxn id="9" idx="2"/>
+            <a:endCxn id="17" idx="0"/>
+          </p:cNvCxnSpPr>
+          <p:nvPr/>
+        </p:nvCxnSpPr>
+        <p:spPr>
+          <a:xfrm>
+            <a:off x="5909689" y="3554000"/>
+            <a:ext cx="1830311" cy="416000"/>
+          </a:xfrm>
+          <a:prstGeom prst="line">
+            <a:avLst/>
+          </a:prstGeom>
+        </p:spPr>
+        <p:style>
+          <a:lnRef idx="1">
+            <a:schemeClr val="dk1"/>
+          </a:lnRef>
+          <a:fillRef idx="0">
+            <a:schemeClr val="dk1"/>
+          </a:fillRef>
+          <a:effectRef idx="0">
+            <a:schemeClr val="dk1"/>
+          </a:effectRef>
+          <a:fontRef idx="minor">
+            <a:schemeClr val="tx1"/>
+          </a:fontRef>
+        </p:style>
+      </p:cxnSp>
+      <p:cxnSp>
+        <p:nvCxnSpPr>
+          <p:cNvPr id="34" name="直接连接符 33">
+            <a:extLst>
+              <a:ext uri="{FF2B5EF4-FFF2-40B4-BE49-F238E27FC236}">
+                <a16:creationId xmlns:a16="http://schemas.microsoft.com/office/drawing/2014/main" id="{C19B3469-6FFE-4AB6-81D4-6F3EB394559A}"/>
+              </a:ext>
+            </a:extLst>
+          </p:cNvPr>
+          <p:cNvCxnSpPr>
+            <a:cxnSpLocks/>
+            <a:stCxn id="10" idx="2"/>
+            <a:endCxn id="18" idx="0"/>
+          </p:cNvCxnSpPr>
+          <p:nvPr/>
+        </p:nvCxnSpPr>
+        <p:spPr>
+          <a:xfrm>
+            <a:off x="7211378" y="3534000"/>
+            <a:ext cx="1572622" cy="436000"/>
+          </a:xfrm>
+          <a:prstGeom prst="line">
+            <a:avLst/>
+          </a:prstGeom>
+        </p:spPr>
+        <p:style>
+          <a:lnRef idx="1">
+            <a:schemeClr val="dk1"/>
+          </a:lnRef>
+          <a:fillRef idx="0">
+            <a:schemeClr val="dk1"/>
+          </a:fillRef>
+          <a:effectRef idx="0">
+            <a:schemeClr val="dk1"/>
+          </a:effectRef>
+          <a:fontRef idx="minor">
+            <a:schemeClr val="tx1"/>
+          </a:fontRef>
+        </p:style>
+      </p:cxnSp>
+      <p:cxnSp>
+        <p:nvCxnSpPr>
+          <p:cNvPr id="35" name="直接连接符 34">
+            <a:extLst>
+              <a:ext uri="{FF2B5EF4-FFF2-40B4-BE49-F238E27FC236}">
+                <a16:creationId xmlns:a16="http://schemas.microsoft.com/office/drawing/2014/main" id="{C38D356A-C002-4220-949B-D8139C307521}"/>
+              </a:ext>
+            </a:extLst>
+          </p:cNvPr>
+          <p:cNvCxnSpPr>
+            <a:cxnSpLocks/>
+            <a:stCxn id="13" idx="2"/>
+            <a:endCxn id="20" idx="0"/>
+          </p:cNvCxnSpPr>
+          <p:nvPr/>
+        </p:nvCxnSpPr>
+        <p:spPr>
+          <a:xfrm flipH="1">
+            <a:off x="3042266" y="4359000"/>
+            <a:ext cx="521734" cy="416000"/>
+          </a:xfrm>
+          <a:prstGeom prst="line">
+            <a:avLst/>
+          </a:prstGeom>
+        </p:spPr>
+        <p:style>
+          <a:lnRef idx="1">
+            <a:schemeClr val="dk1"/>
+          </a:lnRef>
+          <a:fillRef idx="0">
+            <a:schemeClr val="dk1"/>
+          </a:fillRef>
+          <a:effectRef idx="0">
+            <a:schemeClr val="dk1"/>
+          </a:effectRef>
+          <a:fontRef idx="minor">
+            <a:schemeClr val="tx1"/>
+          </a:fontRef>
+        </p:style>
+      </p:cxnSp>
+      <p:cxnSp>
+        <p:nvCxnSpPr>
+          <p:cNvPr id="36" name="直接连接符 35">
+            <a:extLst>
+              <a:ext uri="{FF2B5EF4-FFF2-40B4-BE49-F238E27FC236}">
+                <a16:creationId xmlns:a16="http://schemas.microsoft.com/office/drawing/2014/main" id="{70EFE465-82E8-46D5-AD4B-E073D2F69A03}"/>
+              </a:ext>
+            </a:extLst>
+          </p:cNvPr>
+          <p:cNvCxnSpPr>
+            <a:cxnSpLocks/>
+            <a:stCxn id="13" idx="2"/>
+            <a:endCxn id="21" idx="0"/>
+          </p:cNvCxnSpPr>
+          <p:nvPr/>
+        </p:nvCxnSpPr>
+        <p:spPr>
+          <a:xfrm>
+            <a:off x="3564000" y="4359000"/>
+            <a:ext cx="522266" cy="416000"/>
+          </a:xfrm>
+          <a:prstGeom prst="line">
+            <a:avLst/>
+          </a:prstGeom>
+        </p:spPr>
+        <p:style>
+          <a:lnRef idx="1">
+            <a:schemeClr val="dk1"/>
+          </a:lnRef>
+          <a:fillRef idx="0">
+            <a:schemeClr val="dk1"/>
+          </a:fillRef>
+          <a:effectRef idx="0">
+            <a:schemeClr val="dk1"/>
+          </a:effectRef>
+          <a:fontRef idx="minor">
+            <a:schemeClr val="tx1"/>
+          </a:fontRef>
+        </p:style>
+      </p:cxnSp>
+      <p:cxnSp>
+        <p:nvCxnSpPr>
+          <p:cNvPr id="37" name="直接连接符 36">
+            <a:extLst>
+              <a:ext uri="{FF2B5EF4-FFF2-40B4-BE49-F238E27FC236}">
+                <a16:creationId xmlns:a16="http://schemas.microsoft.com/office/drawing/2014/main" id="{F09FE788-1193-4A3B-8247-5CDDB6987CA3}"/>
+              </a:ext>
+            </a:extLst>
+          </p:cNvPr>
+          <p:cNvCxnSpPr>
+            <a:cxnSpLocks/>
+            <a:stCxn id="14" idx="2"/>
+            <a:endCxn id="22" idx="0"/>
+          </p:cNvCxnSpPr>
+          <p:nvPr/>
+        </p:nvCxnSpPr>
+        <p:spPr>
+          <a:xfrm>
+            <a:off x="4608000" y="4359000"/>
+            <a:ext cx="522266" cy="416000"/>
+          </a:xfrm>
+          <a:prstGeom prst="line">
+            <a:avLst/>
+          </a:prstGeom>
+        </p:spPr>
+        <p:style>
+          <a:lnRef idx="1">
+            <a:schemeClr val="dk1"/>
+          </a:lnRef>
+          <a:fillRef idx="0">
+            <a:schemeClr val="dk1"/>
+          </a:fillRef>
+          <a:effectRef idx="0">
+            <a:schemeClr val="dk1"/>
+          </a:effectRef>
+          <a:fontRef idx="minor">
+            <a:schemeClr val="tx1"/>
+          </a:fontRef>
+        </p:style>
+      </p:cxnSp>
+      <p:cxnSp>
+        <p:nvCxnSpPr>
+          <p:cNvPr id="38" name="直接连接符 37">
+            <a:extLst>
+              <a:ext uri="{FF2B5EF4-FFF2-40B4-BE49-F238E27FC236}">
+                <a16:creationId xmlns:a16="http://schemas.microsoft.com/office/drawing/2014/main" id="{76F45AED-55AA-4E88-9739-D31CB1C97079}"/>
+              </a:ext>
+            </a:extLst>
+          </p:cNvPr>
+          <p:cNvCxnSpPr>
+            <a:cxnSpLocks/>
+            <a:stCxn id="16" idx="2"/>
+            <a:endCxn id="23" idx="0"/>
+          </p:cNvCxnSpPr>
+          <p:nvPr/>
+        </p:nvCxnSpPr>
+        <p:spPr>
+          <a:xfrm>
+            <a:off x="6696000" y="4359000"/>
+            <a:ext cx="0" cy="416000"/>
+          </a:xfrm>
+          <a:prstGeom prst="line">
+            <a:avLst/>
+          </a:prstGeom>
+        </p:spPr>
+        <p:style>
+          <a:lnRef idx="1">
+            <a:schemeClr val="dk1"/>
+          </a:lnRef>
+          <a:fillRef idx="0">
+            <a:schemeClr val="dk1"/>
+          </a:fillRef>
+          <a:effectRef idx="0">
+            <a:schemeClr val="dk1"/>
+          </a:effectRef>
+          <a:fontRef idx="minor">
+            <a:schemeClr val="tx1"/>
+          </a:fontRef>
+        </p:style>
+      </p:cxnSp>
+      <p:cxnSp>
+        <p:nvCxnSpPr>
+          <p:cNvPr id="39" name="直接连接符 38">
+            <a:extLst>
+              <a:ext uri="{FF2B5EF4-FFF2-40B4-BE49-F238E27FC236}">
+                <a16:creationId xmlns:a16="http://schemas.microsoft.com/office/drawing/2014/main" id="{271B5B88-042D-44C3-A2EC-98B5EEFA73A0}"/>
+              </a:ext>
+            </a:extLst>
+          </p:cNvPr>
+          <p:cNvCxnSpPr>
+            <a:cxnSpLocks/>
+            <a:stCxn id="20" idx="2"/>
+            <a:endCxn id="24" idx="0"/>
+          </p:cNvCxnSpPr>
+          <p:nvPr/>
+        </p:nvCxnSpPr>
+        <p:spPr>
+          <a:xfrm>
+            <a:off x="3042266" y="5164000"/>
+            <a:ext cx="0" cy="416000"/>
+          </a:xfrm>
+          <a:prstGeom prst="line">
+            <a:avLst/>
+          </a:prstGeom>
+        </p:spPr>
+        <p:style>
+          <a:lnRef idx="1">
+            <a:schemeClr val="dk1"/>
+          </a:lnRef>
+          <a:fillRef idx="0">
+            <a:schemeClr val="dk1"/>
+          </a:fillRef>
+          <a:effectRef idx="0">
+            <a:schemeClr val="dk1"/>
+          </a:effectRef>
+          <a:fontRef idx="minor">
+            <a:schemeClr val="tx1"/>
+          </a:fontRef>
+        </p:style>
+      </p:cxnSp>
+      <p:pic>
+        <p:nvPicPr>
+          <p:cNvPr id="40" name="图片 39">
+            <a:extLst>
+              <a:ext uri="{FF2B5EF4-FFF2-40B4-BE49-F238E27FC236}">
+                <a16:creationId xmlns:a16="http://schemas.microsoft.com/office/drawing/2014/main" id="{D1B16DBC-6E79-4C7C-805A-C5050C34AAD4}"/>
+              </a:ext>
+            </a:extLst>
+          </p:cNvPr>
+          <p:cNvPicPr>
+            <a:picLocks noChangeAspect="1"/>
+          </p:cNvPicPr>
+          <p:nvPr/>
+        </p:nvPicPr>
+        <p:blipFill>
+          <a:blip r:embed="rId2"/>
+          <a:stretch>
+            <a:fillRect/>
+          </a:stretch>
+        </p:blipFill>
+        <p:spPr>
+          <a:xfrm>
+            <a:off x="8352526" y="4416723"/>
+            <a:ext cx="756000" cy="1552278"/>
+          </a:xfrm>
+          <a:prstGeom prst="rect">
+            <a:avLst/>
+          </a:prstGeom>
+          <a:ln>
+            <a:solidFill>
+              <a:schemeClr val="tx1"/>
+            </a:solidFill>
+          </a:ln>
+        </p:spPr>
+      </p:pic>
+    </p:spTree>
+    <p:extLst>
+      <p:ext uri="{BB962C8B-B14F-4D97-AF65-F5344CB8AC3E}">
+        <p14:creationId xmlns:p14="http://schemas.microsoft.com/office/powerpoint/2010/main" val="1482795242"/>
+      </p:ext>
+    </p:extLst>
+  </p:cSld>
+  <p:clrMapOvr>
+    <a:masterClrMapping/>
+  </p:clrMapOvr>
+</p:sld>
+</file>
+
+<file path=ppt/slides/slide4.xml><?xml version="1.0" encoding="utf-8"?>
+<p:sld xmlns:a="http://schemas.openxmlformats.org/drawingml/2006/main" xmlns:r="http://schemas.openxmlformats.org/officeDocument/2006/relationships" xmlns:p="http://schemas.openxmlformats.org/presentationml/2006/main">
+  <p:cSld>
+    <p:spTree>
+      <p:nvGrpSpPr>
+        <p:cNvPr id="1" name=""/>
+        <p:cNvGrpSpPr/>
+        <p:nvPr/>
+      </p:nvGrpSpPr>
+      <p:grpSpPr>
+        <a:xfrm>
+          <a:off x="0" y="0"/>
+          <a:ext cx="0" cy="0"/>
+          <a:chOff x="0" y="0"/>
+          <a:chExt cx="0" cy="0"/>
+        </a:xfrm>
+      </p:grpSpPr>
+      <p:pic>
+        <p:nvPicPr>
+          <p:cNvPr id="2" name="图片 1">
+            <a:extLst>
+              <a:ext uri="{FF2B5EF4-FFF2-40B4-BE49-F238E27FC236}">
+                <a16:creationId xmlns:a16="http://schemas.microsoft.com/office/drawing/2014/main" id="{577DEDF1-D7B1-4DF4-9AAA-1BB3236D7636}"/>
+              </a:ext>
+            </a:extLst>
+          </p:cNvPr>
+          <p:cNvPicPr>
+            <a:picLocks noChangeAspect="1"/>
+          </p:cNvPicPr>
+          <p:nvPr/>
+        </p:nvPicPr>
+        <p:blipFill>
+          <a:blip r:embed="rId2"/>
+          <a:stretch>
+            <a:fillRect/>
+          </a:stretch>
+        </p:blipFill>
+        <p:spPr>
+          <a:xfrm>
+            <a:off x="6935510" y="-2377896"/>
+            <a:ext cx="5238363" cy="2231551"/>
+          </a:xfrm>
+          <a:prstGeom prst="rect">
+            <a:avLst/>
+          </a:prstGeom>
+        </p:spPr>
+      </p:pic>
+      <p:pic>
+        <p:nvPicPr>
+          <p:cNvPr id="3" name="图片 2">
+            <a:extLst>
+              <a:ext uri="{FF2B5EF4-FFF2-40B4-BE49-F238E27FC236}">
+                <a16:creationId xmlns:a16="http://schemas.microsoft.com/office/drawing/2014/main" id="{0231CF5C-C301-4CC4-B45D-C26AC13B57FB}"/>
+              </a:ext>
+            </a:extLst>
+          </p:cNvPr>
+          <p:cNvPicPr>
+            <a:picLocks noChangeAspect="1"/>
+          </p:cNvPicPr>
+          <p:nvPr/>
+        </p:nvPicPr>
+        <p:blipFill>
+          <a:blip r:embed="rId3"/>
+          <a:stretch>
+            <a:fillRect/>
+          </a:stretch>
+        </p:blipFill>
+        <p:spPr>
+          <a:xfrm>
+            <a:off x="714316" y="-2246519"/>
+            <a:ext cx="3211286" cy="2020628"/>
+          </a:xfrm>
+          <a:prstGeom prst="rect">
+            <a:avLst/>
+          </a:prstGeom>
+        </p:spPr>
+      </p:pic>
+      <p:sp>
+        <p:nvSpPr>
+          <p:cNvPr id="4" name="矩形: 圆角 3">
+            <a:extLst>
+              <a:ext uri="{FF2B5EF4-FFF2-40B4-BE49-F238E27FC236}">
+                <a16:creationId xmlns:a16="http://schemas.microsoft.com/office/drawing/2014/main" id="{728205DF-2A4D-4140-88AD-80916B646907}"/>
+              </a:ext>
+            </a:extLst>
+          </p:cNvPr>
+          <p:cNvSpPr/>
+          <p:nvPr/>
+        </p:nvSpPr>
+        <p:spPr>
+          <a:xfrm>
+            <a:off x="2283958" y="834261"/>
+            <a:ext cx="8540807" cy="359229"/>
+          </a:xfrm>
+          <a:prstGeom prst="roundRect">
+            <a:avLst/>
+          </a:prstGeom>
+          <a:solidFill>
+            <a:schemeClr val="accent3">
+              <a:lumMod val="20000"/>
+              <a:lumOff val="80000"/>
+            </a:schemeClr>
+          </a:solidFill>
+          <a:ln>
+            <a:solidFill>
+              <a:schemeClr val="tx1"/>
+            </a:solidFill>
+          </a:ln>
+        </p:spPr>
+        <p:style>
+          <a:lnRef idx="2">
+            <a:schemeClr val="accent1">
+              <a:shade val="50000"/>
+            </a:schemeClr>
+          </a:lnRef>
+          <a:fillRef idx="1">
+            <a:schemeClr val="accent1"/>
+          </a:fillRef>
+          <a:effectRef idx="0">
+            <a:schemeClr val="accent1"/>
+          </a:effectRef>
+          <a:fontRef idx="minor">
+            <a:schemeClr val="lt1"/>
+          </a:fontRef>
+        </p:style>
+        <p:txBody>
+          <a:bodyPr rtlCol="0" anchor="ctr"/>
+          <a:lstStyle/>
+          <a:p>
+            <a:pPr algn="ctr"/>
+            <a:r>
+              <a:rPr lang="zh-CN" altLang="en-US" b="1" dirty="0">
+                <a:solidFill>
+                  <a:sysClr val="windowText" lastClr="000000"/>
+                </a:solidFill>
+                <a:latin typeface="黑体" panose="02010609060101010101" pitchFamily="49" charset="-122"/>
+                <a:ea typeface="黑体" panose="02010609060101010101" pitchFamily="49" charset="-122"/>
+              </a:rPr>
+              <a:t>第一章 绪论</a:t>
+            </a:r>
+          </a:p>
+        </p:txBody>
+      </p:sp>
+      <p:pic>
+        <p:nvPicPr>
+          <p:cNvPr id="7" name="图片 6">
+            <a:extLst>
+              <a:ext uri="{FF2B5EF4-FFF2-40B4-BE49-F238E27FC236}">
+                <a16:creationId xmlns:a16="http://schemas.microsoft.com/office/drawing/2014/main" id="{16405D97-531B-4CF0-8EAC-57B25C781CB2}"/>
+              </a:ext>
+            </a:extLst>
+          </p:cNvPr>
+          <p:cNvPicPr>
+            <a:picLocks noChangeAspect="1"/>
+          </p:cNvPicPr>
+          <p:nvPr/>
+        </p:nvPicPr>
+        <p:blipFill>
+          <a:blip r:embed="rId4"/>
+          <a:stretch>
+            <a:fillRect/>
+          </a:stretch>
+        </p:blipFill>
+        <p:spPr>
+          <a:xfrm>
+            <a:off x="4155936" y="-1869841"/>
+            <a:ext cx="2513239" cy="1651557"/>
+          </a:xfrm>
+          <a:prstGeom prst="rect">
+            <a:avLst/>
+          </a:prstGeom>
+        </p:spPr>
+      </p:pic>
+      <p:sp>
+        <p:nvSpPr>
+          <p:cNvPr id="10" name="矩形: 圆角 9">
+            <a:extLst>
+              <a:ext uri="{FF2B5EF4-FFF2-40B4-BE49-F238E27FC236}">
+                <a16:creationId xmlns:a16="http://schemas.microsoft.com/office/drawing/2014/main" id="{05AB231D-C4C6-483F-8E92-F4E308144AEF}"/>
+              </a:ext>
+            </a:extLst>
+          </p:cNvPr>
+          <p:cNvSpPr/>
+          <p:nvPr/>
+        </p:nvSpPr>
+        <p:spPr>
+          <a:xfrm>
+            <a:off x="2283958" y="5969009"/>
+            <a:ext cx="8540807" cy="359229"/>
+          </a:xfrm>
+          <a:prstGeom prst="roundRect">
+            <a:avLst/>
+          </a:prstGeom>
+          <a:solidFill>
+            <a:schemeClr val="accent3">
+              <a:lumMod val="20000"/>
+              <a:lumOff val="80000"/>
+            </a:schemeClr>
+          </a:solidFill>
+          <a:ln>
+            <a:solidFill>
+              <a:schemeClr val="tx1"/>
+            </a:solidFill>
+          </a:ln>
+        </p:spPr>
+        <p:style>
+          <a:lnRef idx="2">
+            <a:schemeClr val="accent1">
+              <a:shade val="50000"/>
+            </a:schemeClr>
+          </a:lnRef>
+          <a:fillRef idx="1">
+            <a:schemeClr val="accent1"/>
+          </a:fillRef>
+          <a:effectRef idx="0">
+            <a:schemeClr val="accent1"/>
+          </a:effectRef>
+          <a:fontRef idx="minor">
+            <a:schemeClr val="lt1"/>
+          </a:fontRef>
+        </p:style>
+        <p:txBody>
+          <a:bodyPr rtlCol="0" anchor="ctr"/>
+          <a:lstStyle/>
+          <a:p>
+            <a:pPr algn="ctr"/>
+            <a:r>
+              <a:rPr lang="zh-CN" altLang="en-US" b="1" dirty="0">
+                <a:solidFill>
+                  <a:sysClr val="windowText" lastClr="000000"/>
+                </a:solidFill>
+                <a:latin typeface="黑体" panose="02010609060101010101" pitchFamily="49" charset="-122"/>
+                <a:ea typeface="黑体" panose="02010609060101010101" pitchFamily="49" charset="-122"/>
+              </a:rPr>
+              <a:t>第六章 总结与展望</a:t>
+            </a:r>
+          </a:p>
+        </p:txBody>
+      </p:sp>
+      <p:grpSp>
+        <p:nvGrpSpPr>
+          <p:cNvPr id="22" name="组合 21">
+            <a:extLst>
+              <a:ext uri="{FF2B5EF4-FFF2-40B4-BE49-F238E27FC236}">
+                <a16:creationId xmlns:a16="http://schemas.microsoft.com/office/drawing/2014/main" id="{850DA158-8450-461D-AC5B-FABF4CBC48E7}"/>
+              </a:ext>
+            </a:extLst>
+          </p:cNvPr>
+          <p:cNvGrpSpPr/>
+          <p:nvPr/>
+        </p:nvGrpSpPr>
+        <p:grpSpPr>
+          <a:xfrm>
+            <a:off x="2283959" y="3096619"/>
+            <a:ext cx="8540806" cy="2664000"/>
+            <a:chOff x="2283959" y="3199721"/>
+            <a:chExt cx="8540806" cy="2664000"/>
+          </a:xfrm>
+        </p:grpSpPr>
+        <p:sp>
+          <p:nvSpPr>
+            <p:cNvPr id="6" name="矩形: 圆角 5">
+              <a:extLst>
+                <a:ext uri="{FF2B5EF4-FFF2-40B4-BE49-F238E27FC236}">
+                  <a16:creationId xmlns:a16="http://schemas.microsoft.com/office/drawing/2014/main" id="{C7B0F757-0DA2-43CF-8B34-A06087C9FD70}"/>
+                </a:ext>
+              </a:extLst>
+            </p:cNvPr>
+            <p:cNvSpPr/>
+            <p:nvPr/>
+          </p:nvSpPr>
+          <p:spPr>
+            <a:xfrm>
+              <a:off x="2283959" y="3199721"/>
+              <a:ext cx="2736000" cy="2664000"/>
+            </a:xfrm>
+            <a:prstGeom prst="roundRect">
+              <a:avLst>
+                <a:gd name="adj" fmla="val 8579"/>
+              </a:avLst>
+            </a:prstGeom>
+            <a:solidFill>
+              <a:schemeClr val="accent4">
+                <a:lumMod val="20000"/>
+                <a:lumOff val="80000"/>
+              </a:schemeClr>
+            </a:solidFill>
+            <a:ln>
+              <a:solidFill>
+                <a:schemeClr val="tx1"/>
+              </a:solidFill>
+            </a:ln>
+          </p:spPr>
+          <p:style>
+            <a:lnRef idx="2">
+              <a:schemeClr val="accent1">
+                <a:shade val="50000"/>
+              </a:schemeClr>
+            </a:lnRef>
+            <a:fillRef idx="1">
+              <a:schemeClr val="accent1"/>
+            </a:fillRef>
+            <a:effectRef idx="0">
+              <a:schemeClr val="accent1"/>
+            </a:effectRef>
+            <a:fontRef idx="minor">
+              <a:schemeClr val="lt1"/>
+            </a:fontRef>
+          </p:style>
+          <p:txBody>
+            <a:bodyPr rtlCol="0" anchor="t"/>
+            <a:lstStyle/>
+            <a:p>
+              <a:pPr algn="ctr">
+                <a:spcAft>
+                  <a:spcPts val="1200"/>
+                </a:spcAft>
+              </a:pPr>
+              <a:r>
+                <a:rPr lang="zh-CN" altLang="en-US" b="1" dirty="0">
+                  <a:solidFill>
+                    <a:sysClr val="windowText" lastClr="000000"/>
+                  </a:solidFill>
+                  <a:latin typeface="黑体" panose="02010609060101010101" pitchFamily="49" charset="-122"/>
+                  <a:ea typeface="黑体" panose="02010609060101010101" pitchFamily="49" charset="-122"/>
+                </a:rPr>
+                <a:t>第三章 激进的极大二分团枚举</a:t>
+              </a:r>
+              <a:r>
+                <a:rPr lang="zh-CN" altLang="en-US" b="1" dirty="0">
+                  <a:solidFill>
+                    <a:srgbClr val="FF0000"/>
+                  </a:solidFill>
+                  <a:latin typeface="黑体" panose="02010609060101010101" pitchFamily="49" charset="-122"/>
+                  <a:ea typeface="黑体" panose="02010609060101010101" pitchFamily="49" charset="-122"/>
+                </a:rPr>
+                <a:t>剪枝方法</a:t>
+              </a:r>
+              <a:endParaRPr lang="en-US" altLang="zh-CN" b="1" dirty="0">
+                <a:solidFill>
+                  <a:srgbClr val="FF0000"/>
+                </a:solidFill>
+                <a:latin typeface="黑体" panose="02010609060101010101" pitchFamily="49" charset="-122"/>
+                <a:ea typeface="黑体" panose="02010609060101010101" pitchFamily="49" charset="-122"/>
+              </a:endParaRPr>
+            </a:p>
+            <a:p>
+              <a:pPr marL="285750" indent="-285750">
+                <a:buFont typeface="Arial" panose="020B0604020202020204" pitchFamily="34" charset="0"/>
+                <a:buChar char="•"/>
+              </a:pPr>
+              <a:r>
+                <a:rPr lang="zh-CN" altLang="en-US" sz="1600" dirty="0">
+                  <a:solidFill>
+                    <a:sysClr val="windowText" lastClr="000000"/>
+                  </a:solidFill>
+                </a:rPr>
+                <a:t>提出激进的集合枚举树</a:t>
+              </a:r>
+              <a:endParaRPr lang="en-US" altLang="zh-CN" sz="1600" dirty="0">
+                <a:solidFill>
+                  <a:sysClr val="windowText" lastClr="000000"/>
+                </a:solidFill>
+              </a:endParaRPr>
+            </a:p>
+            <a:p>
+              <a:pPr marL="285750" indent="-285750">
+                <a:buFont typeface="Arial" panose="020B0604020202020204" pitchFamily="34" charset="0"/>
+                <a:buChar char="•"/>
+              </a:pPr>
+              <a:r>
+                <a:rPr lang="zh-CN" altLang="en-US" sz="1600" dirty="0">
+                  <a:solidFill>
+                    <a:sysClr val="windowText" lastClr="000000"/>
+                  </a:solidFill>
+                </a:rPr>
+                <a:t>提出激进的节点融合剪枝方法</a:t>
+              </a:r>
+              <a:endParaRPr lang="en-US" altLang="zh-CN" sz="1600" dirty="0">
+                <a:solidFill>
+                  <a:sysClr val="windowText" lastClr="000000"/>
+                </a:solidFill>
+              </a:endParaRPr>
+            </a:p>
+            <a:p>
+              <a:pPr marL="285750" indent="-285750">
+                <a:buFont typeface="Arial" panose="020B0604020202020204" pitchFamily="34" charset="0"/>
+                <a:buChar char="•"/>
+              </a:pPr>
+              <a:r>
+                <a:rPr lang="zh-CN" altLang="en-US" sz="1600" dirty="0">
+                  <a:solidFill>
+                    <a:sysClr val="windowText" lastClr="000000"/>
+                  </a:solidFill>
+                </a:rPr>
+                <a:t>形成</a:t>
+              </a:r>
+              <a:r>
+                <a:rPr lang="en-US" altLang="zh-CN" sz="1600" b="1" dirty="0">
+                  <a:solidFill>
+                    <a:sysClr val="windowText" lastClr="000000"/>
+                  </a:solidFill>
+                </a:rPr>
+                <a:t>AMBEA</a:t>
+              </a:r>
+              <a:r>
+                <a:rPr lang="zh-CN" altLang="en-US" sz="1600" dirty="0">
+                  <a:solidFill>
+                    <a:sysClr val="windowText" lastClr="000000"/>
+                  </a:solidFill>
+                </a:rPr>
+                <a:t>算法</a:t>
+              </a:r>
+            </a:p>
+          </p:txBody>
+        </p:sp>
+        <p:sp>
+          <p:nvSpPr>
+            <p:cNvPr id="11" name="矩形: 圆角 10">
+              <a:extLst>
+                <a:ext uri="{FF2B5EF4-FFF2-40B4-BE49-F238E27FC236}">
+                  <a16:creationId xmlns:a16="http://schemas.microsoft.com/office/drawing/2014/main" id="{11048FFD-3196-43F5-ADCB-7F41C1CFB6F4}"/>
+                </a:ext>
+              </a:extLst>
+            </p:cNvPr>
+            <p:cNvSpPr/>
+            <p:nvPr/>
+          </p:nvSpPr>
+          <p:spPr>
+            <a:xfrm>
+              <a:off x="5186362" y="3199721"/>
+              <a:ext cx="2736000" cy="2664000"/>
+            </a:xfrm>
+            <a:prstGeom prst="roundRect">
+              <a:avLst>
+                <a:gd name="adj" fmla="val 8579"/>
+              </a:avLst>
+            </a:prstGeom>
+            <a:solidFill>
+              <a:schemeClr val="accent5">
+                <a:lumMod val="20000"/>
+                <a:lumOff val="80000"/>
+              </a:schemeClr>
+            </a:solidFill>
+            <a:ln>
+              <a:solidFill>
+                <a:schemeClr val="tx1"/>
+              </a:solidFill>
+            </a:ln>
+          </p:spPr>
+          <p:style>
+            <a:lnRef idx="2">
+              <a:schemeClr val="accent1">
+                <a:shade val="50000"/>
+              </a:schemeClr>
+            </a:lnRef>
+            <a:fillRef idx="1">
+              <a:schemeClr val="accent1"/>
+            </a:fillRef>
+            <a:effectRef idx="0">
+              <a:schemeClr val="accent1"/>
+            </a:effectRef>
+            <a:fontRef idx="minor">
+              <a:schemeClr val="lt1"/>
+            </a:fontRef>
+          </p:style>
+          <p:txBody>
+            <a:bodyPr rtlCol="0" anchor="t"/>
+            <a:lstStyle/>
+            <a:p>
+              <a:pPr algn="ctr">
+                <a:spcAft>
+                  <a:spcPts val="1200"/>
+                </a:spcAft>
+              </a:pPr>
+              <a:r>
+                <a:rPr lang="zh-CN" altLang="en-US" b="1" dirty="0">
+                  <a:solidFill>
+                    <a:sysClr val="windowText" lastClr="000000"/>
+                  </a:solidFill>
+                  <a:latin typeface="黑体" panose="02010609060101010101" pitchFamily="49" charset="-122"/>
+                  <a:ea typeface="黑体" panose="02010609060101010101" pitchFamily="49" charset="-122"/>
+                </a:rPr>
+                <a:t>第四章 自适应的极大二分团枚举</a:t>
+              </a:r>
+              <a:r>
+                <a:rPr lang="zh-CN" altLang="en-US" b="1" dirty="0">
+                  <a:solidFill>
+                    <a:srgbClr val="FF0000"/>
+                  </a:solidFill>
+                  <a:latin typeface="黑体" panose="02010609060101010101" pitchFamily="49" charset="-122"/>
+                  <a:ea typeface="黑体" panose="02010609060101010101" pitchFamily="49" charset="-122"/>
+                </a:rPr>
+                <a:t>数据结构</a:t>
+              </a:r>
+              <a:endParaRPr lang="en-US" altLang="zh-CN" b="1" dirty="0">
+                <a:solidFill>
+                  <a:srgbClr val="FF0000"/>
+                </a:solidFill>
+                <a:latin typeface="黑体" panose="02010609060101010101" pitchFamily="49" charset="-122"/>
+                <a:ea typeface="黑体" panose="02010609060101010101" pitchFamily="49" charset="-122"/>
+              </a:endParaRPr>
+            </a:p>
+            <a:p>
+              <a:pPr marL="285750" indent="-285750">
+                <a:buFont typeface="Arial" panose="020B0604020202020204" pitchFamily="34" charset="0"/>
+                <a:buChar char="•"/>
+              </a:pPr>
+              <a:r>
+                <a:rPr lang="zh-CN" altLang="en-US" sz="1600" dirty="0">
+                  <a:solidFill>
+                    <a:sysClr val="windowText" lastClr="000000"/>
+                  </a:solidFill>
+                </a:rPr>
+                <a:t>提出基于位图的子图计算模式</a:t>
+              </a:r>
+              <a:endParaRPr lang="en-US" altLang="zh-CN" sz="1600" dirty="0">
+                <a:solidFill>
+                  <a:sysClr val="windowText" lastClr="000000"/>
+                </a:solidFill>
+              </a:endParaRPr>
+            </a:p>
+            <a:p>
+              <a:pPr marL="285750" indent="-285750">
+                <a:buFont typeface="Arial" panose="020B0604020202020204" pitchFamily="34" charset="0"/>
+                <a:buChar char="•"/>
+              </a:pPr>
+              <a:r>
+                <a:rPr lang="zh-CN" altLang="en-US" sz="1600" dirty="0">
+                  <a:solidFill>
+                    <a:sysClr val="windowText" lastClr="000000"/>
+                  </a:solidFill>
+                </a:rPr>
+                <a:t>提出基于邻接表的横向计算模式</a:t>
+              </a:r>
+              <a:endParaRPr lang="en-US" altLang="zh-CN" sz="1600" dirty="0">
+                <a:solidFill>
+                  <a:sysClr val="windowText" lastClr="000000"/>
+                </a:solidFill>
+              </a:endParaRPr>
+            </a:p>
+            <a:p>
+              <a:pPr marL="285750" indent="-285750">
+                <a:buFont typeface="Arial" panose="020B0604020202020204" pitchFamily="34" charset="0"/>
+                <a:buChar char="•"/>
+              </a:pPr>
+              <a:r>
+                <a:rPr lang="zh-CN" altLang="en-US" sz="1600" dirty="0">
+                  <a:solidFill>
+                    <a:sysClr val="windowText" lastClr="000000"/>
+                  </a:solidFill>
+                </a:rPr>
+                <a:t>形成</a:t>
+              </a:r>
+              <a:r>
+                <a:rPr lang="en-US" altLang="zh-CN" sz="1600" b="1" dirty="0" err="1">
+                  <a:solidFill>
+                    <a:sysClr val="windowText" lastClr="000000"/>
+                  </a:solidFill>
+                </a:rPr>
+                <a:t>AdaptMBE</a:t>
+              </a:r>
+              <a:r>
+                <a:rPr lang="zh-CN" altLang="en-US" sz="1600" dirty="0">
+                  <a:solidFill>
+                    <a:sysClr val="windowText" lastClr="000000"/>
+                  </a:solidFill>
+                </a:rPr>
+                <a:t>算法</a:t>
+              </a:r>
+            </a:p>
+          </p:txBody>
+        </p:sp>
+        <p:sp>
+          <p:nvSpPr>
+            <p:cNvPr id="12" name="矩形: 圆角 11">
+              <a:extLst>
+                <a:ext uri="{FF2B5EF4-FFF2-40B4-BE49-F238E27FC236}">
+                  <a16:creationId xmlns:a16="http://schemas.microsoft.com/office/drawing/2014/main" id="{58A3B694-62C8-4699-9C24-B29B76446BCD}"/>
+                </a:ext>
+              </a:extLst>
+            </p:cNvPr>
+            <p:cNvSpPr/>
+            <p:nvPr/>
+          </p:nvSpPr>
+          <p:spPr>
+            <a:xfrm>
+              <a:off x="8088765" y="3199721"/>
+              <a:ext cx="2736000" cy="2664000"/>
+            </a:xfrm>
+            <a:prstGeom prst="roundRect">
+              <a:avLst>
+                <a:gd name="adj" fmla="val 8579"/>
+              </a:avLst>
+            </a:prstGeom>
+            <a:solidFill>
+              <a:schemeClr val="accent6">
+                <a:lumMod val="20000"/>
+                <a:lumOff val="80000"/>
+              </a:schemeClr>
+            </a:solidFill>
+            <a:ln>
+              <a:solidFill>
+                <a:schemeClr val="tx1"/>
+              </a:solidFill>
+            </a:ln>
+          </p:spPr>
+          <p:style>
+            <a:lnRef idx="2">
+              <a:schemeClr val="accent1">
+                <a:shade val="50000"/>
+              </a:schemeClr>
+            </a:lnRef>
+            <a:fillRef idx="1">
+              <a:schemeClr val="accent1"/>
+            </a:fillRef>
+            <a:effectRef idx="0">
+              <a:schemeClr val="accent1"/>
+            </a:effectRef>
+            <a:fontRef idx="minor">
+              <a:schemeClr val="lt1"/>
+            </a:fontRef>
+          </p:style>
+          <p:txBody>
+            <a:bodyPr rtlCol="0" anchor="t"/>
+            <a:lstStyle/>
+            <a:p>
+              <a:pPr algn="ctr">
+                <a:spcAft>
+                  <a:spcPts val="1200"/>
+                </a:spcAft>
+              </a:pPr>
+              <a:r>
+                <a:rPr lang="zh-CN" altLang="en-US" b="1" dirty="0">
+                  <a:solidFill>
+                    <a:sysClr val="windowText" lastClr="000000"/>
+                  </a:solidFill>
+                  <a:latin typeface="黑体" panose="02010609060101010101" pitchFamily="49" charset="-122"/>
+                  <a:ea typeface="黑体" panose="02010609060101010101" pitchFamily="49" charset="-122"/>
+                </a:rPr>
+                <a:t>第五章 基于</a:t>
+              </a:r>
+              <a:r>
+                <a:rPr lang="en-US" altLang="zh-CN" b="1" dirty="0">
+                  <a:solidFill>
+                    <a:sysClr val="windowText" lastClr="000000"/>
+                  </a:solidFill>
+                  <a:latin typeface="黑体" panose="02010609060101010101" pitchFamily="49" charset="-122"/>
+                  <a:ea typeface="黑体" panose="02010609060101010101" pitchFamily="49" charset="-122"/>
+                </a:rPr>
+                <a:t>GPU</a:t>
+              </a:r>
+              <a:r>
+                <a:rPr lang="zh-CN" altLang="en-US" b="1" dirty="0">
+                  <a:solidFill>
+                    <a:sysClr val="windowText" lastClr="000000"/>
+                  </a:solidFill>
+                  <a:latin typeface="黑体" panose="02010609060101010101" pitchFamily="49" charset="-122"/>
+                  <a:ea typeface="黑体" panose="02010609060101010101" pitchFamily="49" charset="-122"/>
+                </a:rPr>
+                <a:t>的极大二分团枚举</a:t>
+              </a:r>
+              <a:r>
+                <a:rPr lang="zh-CN" altLang="en-US" b="1" dirty="0">
+                  <a:solidFill>
+                    <a:srgbClr val="FF0000"/>
+                  </a:solidFill>
+                  <a:latin typeface="黑体" panose="02010609060101010101" pitchFamily="49" charset="-122"/>
+                  <a:ea typeface="黑体" panose="02010609060101010101" pitchFamily="49" charset="-122"/>
+                </a:rPr>
+                <a:t>并行实现</a:t>
+              </a:r>
+            </a:p>
+            <a:p>
+              <a:pPr marL="285750" indent="-285750">
+                <a:buFont typeface="Arial" panose="020B0604020202020204" pitchFamily="34" charset="0"/>
+                <a:buChar char="•"/>
+              </a:pPr>
+              <a:r>
+                <a:rPr lang="zh-CN" altLang="en-US" sz="1600" dirty="0">
+                  <a:solidFill>
+                    <a:sysClr val="windowText" lastClr="000000"/>
+                  </a:solidFill>
+                </a:rPr>
+                <a:t>提出基于节点重用的迭代计算流程</a:t>
+              </a:r>
+              <a:endParaRPr lang="en-US" altLang="zh-CN" sz="1600" dirty="0">
+                <a:solidFill>
+                  <a:sysClr val="windowText" lastClr="000000"/>
+                </a:solidFill>
+              </a:endParaRPr>
+            </a:p>
+            <a:p>
+              <a:pPr marL="285750" indent="-285750">
+                <a:buFont typeface="Arial" panose="020B0604020202020204" pitchFamily="34" charset="0"/>
+                <a:buChar char="•"/>
+              </a:pPr>
+              <a:r>
+                <a:rPr lang="zh-CN" altLang="en-US" sz="1600" dirty="0">
+                  <a:solidFill>
+                    <a:sysClr val="windowText" lastClr="000000"/>
+                  </a:solidFill>
+                </a:rPr>
+                <a:t>提出基于局部邻居数量感知的剪枝方法</a:t>
+              </a:r>
+              <a:endParaRPr lang="en-US" altLang="zh-CN" sz="1600" dirty="0">
+                <a:solidFill>
+                  <a:sysClr val="windowText" lastClr="000000"/>
+                </a:solidFill>
+              </a:endParaRPr>
+            </a:p>
+            <a:p>
+              <a:pPr marL="285750" indent="-285750">
+                <a:buFont typeface="Arial" panose="020B0604020202020204" pitchFamily="34" charset="0"/>
+                <a:buChar char="•"/>
+              </a:pPr>
+              <a:r>
+                <a:rPr lang="zh-CN" altLang="en-US" sz="1600" dirty="0">
+                  <a:solidFill>
+                    <a:sysClr val="windowText" lastClr="000000"/>
+                  </a:solidFill>
+                </a:rPr>
+                <a:t>提出负载感知的任务调度方法</a:t>
+              </a:r>
+              <a:endParaRPr lang="en-US" altLang="zh-CN" sz="1600" dirty="0">
+                <a:solidFill>
+                  <a:sysClr val="windowText" lastClr="000000"/>
+                </a:solidFill>
+              </a:endParaRPr>
+            </a:p>
+            <a:p>
+              <a:pPr marL="285750" indent="-285750">
+                <a:buFont typeface="Arial" panose="020B0604020202020204" pitchFamily="34" charset="0"/>
+                <a:buChar char="•"/>
+              </a:pPr>
+              <a:r>
+                <a:rPr lang="zh-CN" altLang="en-US" sz="1600" dirty="0">
+                  <a:solidFill>
+                    <a:sysClr val="windowText" lastClr="000000"/>
+                  </a:solidFill>
+                </a:rPr>
+                <a:t>形成</a:t>
+              </a:r>
+              <a:r>
+                <a:rPr lang="en-US" altLang="zh-CN" sz="1600" b="1" dirty="0">
+                  <a:solidFill>
+                    <a:sysClr val="windowText" lastClr="000000"/>
+                  </a:solidFill>
+                </a:rPr>
+                <a:t>GMBE</a:t>
+              </a:r>
+              <a:r>
+                <a:rPr lang="zh-CN" altLang="en-US" sz="1600" dirty="0">
+                  <a:solidFill>
+                    <a:sysClr val="windowText" lastClr="000000"/>
+                  </a:solidFill>
+                </a:rPr>
+                <a:t>算法</a:t>
+              </a:r>
+              <a:endParaRPr lang="en-US" altLang="zh-CN" sz="1600" dirty="0">
+                <a:solidFill>
+                  <a:sysClr val="windowText" lastClr="000000"/>
+                </a:solidFill>
+              </a:endParaRPr>
+            </a:p>
+            <a:p>
+              <a:pPr marL="285750" indent="-285750">
+                <a:buFont typeface="Arial" panose="020B0604020202020204" pitchFamily="34" charset="0"/>
+                <a:buChar char="•"/>
+              </a:pPr>
+              <a:endParaRPr lang="zh-CN" altLang="en-US" sz="1600" dirty="0">
+                <a:solidFill>
+                  <a:sysClr val="windowText" lastClr="000000"/>
+                </a:solidFill>
+              </a:endParaRPr>
+            </a:p>
+          </p:txBody>
+        </p:sp>
+      </p:grpSp>
+      <p:grpSp>
+        <p:nvGrpSpPr>
+          <p:cNvPr id="21" name="组合 20">
+            <a:extLst>
+              <a:ext uri="{FF2B5EF4-FFF2-40B4-BE49-F238E27FC236}">
+                <a16:creationId xmlns:a16="http://schemas.microsoft.com/office/drawing/2014/main" id="{65901D29-F896-4FA4-B291-AD7996DAAFDD}"/>
+              </a:ext>
+            </a:extLst>
+          </p:cNvPr>
+          <p:cNvGrpSpPr/>
+          <p:nvPr/>
+        </p:nvGrpSpPr>
+        <p:grpSpPr>
+          <a:xfrm>
+            <a:off x="2283958" y="1401880"/>
+            <a:ext cx="8540807" cy="1486349"/>
+            <a:chOff x="2283958" y="1418896"/>
+            <a:chExt cx="8540807" cy="1486349"/>
+          </a:xfrm>
+        </p:grpSpPr>
+        <p:sp>
+          <p:nvSpPr>
+            <p:cNvPr id="13" name="矩形: 圆角 12">
+              <a:extLst>
+                <a:ext uri="{FF2B5EF4-FFF2-40B4-BE49-F238E27FC236}">
+                  <a16:creationId xmlns:a16="http://schemas.microsoft.com/office/drawing/2014/main" id="{580F4E76-C242-4EB6-BF37-93209E27AE4A}"/>
+                </a:ext>
+              </a:extLst>
+            </p:cNvPr>
+            <p:cNvSpPr/>
+            <p:nvPr/>
+          </p:nvSpPr>
+          <p:spPr>
+            <a:xfrm>
+              <a:off x="2283958" y="1418896"/>
+              <a:ext cx="8540807" cy="1486349"/>
+            </a:xfrm>
+            <a:prstGeom prst="roundRect">
+              <a:avLst>
+                <a:gd name="adj" fmla="val 8579"/>
+              </a:avLst>
+            </a:prstGeom>
+            <a:solidFill>
+              <a:schemeClr val="accent3">
+                <a:lumMod val="20000"/>
+                <a:lumOff val="80000"/>
+              </a:schemeClr>
+            </a:solidFill>
+            <a:ln>
+              <a:solidFill>
+                <a:schemeClr val="tx1"/>
+              </a:solidFill>
+            </a:ln>
+          </p:spPr>
+          <p:style>
+            <a:lnRef idx="2">
+              <a:schemeClr val="accent1">
+                <a:shade val="50000"/>
+              </a:schemeClr>
+            </a:lnRef>
+            <a:fillRef idx="1">
+              <a:schemeClr val="accent1"/>
+            </a:fillRef>
+            <a:effectRef idx="0">
+              <a:schemeClr val="accent1"/>
+            </a:effectRef>
+            <a:fontRef idx="minor">
+              <a:schemeClr val="lt1"/>
+            </a:fontRef>
+          </p:style>
+          <p:txBody>
+            <a:bodyPr rtlCol="0" anchor="t"/>
+            <a:lstStyle/>
+            <a:p>
+              <a:pPr algn="ctr">
+                <a:spcAft>
+                  <a:spcPts val="1200"/>
+                </a:spcAft>
+              </a:pPr>
+              <a:r>
+                <a:rPr lang="zh-CN" altLang="en-US" b="1" dirty="0">
+                  <a:solidFill>
+                    <a:sysClr val="windowText" lastClr="000000"/>
+                  </a:solidFill>
+                  <a:latin typeface="黑体" panose="02010609060101010101" pitchFamily="49" charset="-122"/>
+                  <a:ea typeface="黑体" panose="02010609060101010101" pitchFamily="49" charset="-122"/>
+                </a:rPr>
+                <a:t>第二章 极大二分团枚举问题</a:t>
+              </a:r>
+              <a:endParaRPr lang="en-US" altLang="zh-CN" b="1" dirty="0">
+                <a:solidFill>
+                  <a:srgbClr val="0070C0"/>
+                </a:solidFill>
+                <a:latin typeface="黑体" panose="02010609060101010101" pitchFamily="49" charset="-122"/>
+                <a:ea typeface="黑体" panose="02010609060101010101" pitchFamily="49" charset="-122"/>
+              </a:endParaRPr>
+            </a:p>
+            <a:p>
+              <a:pPr marL="285750" indent="-285750">
+                <a:buFont typeface="Arial" panose="020B0604020202020204" pitchFamily="34" charset="0"/>
+                <a:buChar char="•"/>
+              </a:pPr>
+              <a:r>
+                <a:rPr lang="zh-CN" altLang="en-US" sz="1600" dirty="0">
+                  <a:solidFill>
+                    <a:sysClr val="windowText" lastClr="000000"/>
+                  </a:solidFill>
+                </a:rPr>
+                <a:t>极大二分团枚举问题定义</a:t>
+              </a:r>
+              <a:endParaRPr lang="en-US" altLang="zh-CN" sz="1600" dirty="0">
+                <a:solidFill>
+                  <a:sysClr val="windowText" lastClr="000000"/>
+                </a:solidFill>
+              </a:endParaRPr>
+            </a:p>
+            <a:p>
+              <a:pPr marL="285750" indent="-285750">
+                <a:buFont typeface="Arial" panose="020B0604020202020204" pitchFamily="34" charset="0"/>
+                <a:buChar char="•"/>
+              </a:pPr>
+              <a:r>
+                <a:rPr lang="zh-CN" altLang="en-US" sz="1600" dirty="0">
+                  <a:solidFill>
+                    <a:sysClr val="windowText" lastClr="000000"/>
+                  </a:solidFill>
+                </a:rPr>
+                <a:t>存在的</a:t>
+              </a:r>
+              <a:r>
+                <a:rPr lang="zh-CN" altLang="en-US" sz="1600">
+                  <a:solidFill>
+                    <a:sysClr val="windowText" lastClr="000000"/>
+                  </a:solidFill>
+                </a:rPr>
+                <a:t>问题与挑战</a:t>
+              </a:r>
+              <a:endParaRPr lang="en-US" altLang="zh-CN" sz="1600" dirty="0">
+                <a:solidFill>
+                  <a:sysClr val="windowText" lastClr="000000"/>
+                </a:solidFill>
+              </a:endParaRPr>
+            </a:p>
+          </p:txBody>
+        </p:sp>
+        <p:sp>
+          <p:nvSpPr>
+            <p:cNvPr id="14" name="矩形: 圆角 13">
+              <a:extLst>
+                <a:ext uri="{FF2B5EF4-FFF2-40B4-BE49-F238E27FC236}">
+                  <a16:creationId xmlns:a16="http://schemas.microsoft.com/office/drawing/2014/main" id="{2FB1DDB0-DF8F-4997-BE76-06AF79695706}"/>
+                </a:ext>
+              </a:extLst>
+            </p:cNvPr>
+            <p:cNvSpPr/>
+            <p:nvPr/>
+          </p:nvSpPr>
+          <p:spPr>
+            <a:xfrm>
+              <a:off x="2319959" y="2462731"/>
+              <a:ext cx="2664000" cy="359229"/>
+            </a:xfrm>
+            <a:prstGeom prst="roundRect">
+              <a:avLst/>
+            </a:prstGeom>
+            <a:solidFill>
+              <a:schemeClr val="accent4">
+                <a:lumMod val="20000"/>
+                <a:lumOff val="80000"/>
+              </a:schemeClr>
+            </a:solidFill>
+            <a:ln>
+              <a:solidFill>
+                <a:schemeClr val="tx1"/>
+              </a:solidFill>
+            </a:ln>
+          </p:spPr>
+          <p:style>
+            <a:lnRef idx="2">
+              <a:schemeClr val="accent1">
+                <a:shade val="50000"/>
+              </a:schemeClr>
+            </a:lnRef>
+            <a:fillRef idx="1">
+              <a:schemeClr val="accent1"/>
+            </a:fillRef>
+            <a:effectRef idx="0">
+              <a:schemeClr val="accent1"/>
+            </a:effectRef>
+            <a:fontRef idx="minor">
+              <a:schemeClr val="lt1"/>
+            </a:fontRef>
+          </p:style>
+          <p:txBody>
+            <a:bodyPr rtlCol="0" anchor="ctr"/>
+            <a:lstStyle/>
+            <a:p>
+              <a:pPr algn="ctr"/>
+              <a:r>
+                <a:rPr lang="zh-CN" altLang="en-US" sz="1600" dirty="0">
+                  <a:solidFill>
+                    <a:sysClr val="windowText" lastClr="000000"/>
+                  </a:solidFill>
+                </a:rPr>
+                <a:t>枚举空间大，剪枝方法低效</a:t>
+              </a:r>
+            </a:p>
+          </p:txBody>
+        </p:sp>
+        <p:sp>
+          <p:nvSpPr>
+            <p:cNvPr id="16" name="矩形: 圆角 15">
+              <a:extLst>
+                <a:ext uri="{FF2B5EF4-FFF2-40B4-BE49-F238E27FC236}">
+                  <a16:creationId xmlns:a16="http://schemas.microsoft.com/office/drawing/2014/main" id="{B58E0152-76BD-41E5-985A-7B72E3A2D337}"/>
+                </a:ext>
+              </a:extLst>
+            </p:cNvPr>
+            <p:cNvSpPr/>
+            <p:nvPr/>
+          </p:nvSpPr>
+          <p:spPr>
+            <a:xfrm>
+              <a:off x="5222361" y="2466043"/>
+              <a:ext cx="2664000" cy="359229"/>
+            </a:xfrm>
+            <a:prstGeom prst="roundRect">
+              <a:avLst/>
+            </a:prstGeom>
+            <a:solidFill>
+              <a:schemeClr val="accent5">
+                <a:lumMod val="20000"/>
+                <a:lumOff val="80000"/>
+              </a:schemeClr>
+            </a:solidFill>
+            <a:ln>
+              <a:solidFill>
+                <a:schemeClr val="tx1"/>
+              </a:solidFill>
+            </a:ln>
+          </p:spPr>
+          <p:style>
+            <a:lnRef idx="2">
+              <a:schemeClr val="accent1">
+                <a:shade val="50000"/>
+              </a:schemeClr>
+            </a:lnRef>
+            <a:fillRef idx="1">
+              <a:schemeClr val="accent1"/>
+            </a:fillRef>
+            <a:effectRef idx="0">
+              <a:schemeClr val="accent1"/>
+            </a:effectRef>
+            <a:fontRef idx="minor">
+              <a:schemeClr val="lt1"/>
+            </a:fontRef>
+          </p:style>
+          <p:txBody>
+            <a:bodyPr rtlCol="0" anchor="ctr"/>
+            <a:lstStyle/>
+            <a:p>
+              <a:pPr algn="ctr"/>
+              <a:r>
+                <a:rPr lang="zh-CN" altLang="en-US" sz="1600" dirty="0">
+                  <a:solidFill>
+                    <a:sysClr val="windowText" lastClr="000000"/>
+                  </a:solidFill>
+                </a:rPr>
+                <a:t>单一数据结构效率低</a:t>
+              </a:r>
+            </a:p>
+          </p:txBody>
+        </p:sp>
+        <p:sp>
+          <p:nvSpPr>
+            <p:cNvPr id="17" name="矩形: 圆角 16">
+              <a:extLst>
+                <a:ext uri="{FF2B5EF4-FFF2-40B4-BE49-F238E27FC236}">
+                  <a16:creationId xmlns:a16="http://schemas.microsoft.com/office/drawing/2014/main" id="{D1057210-D616-477A-BB44-42E6486CD096}"/>
+                </a:ext>
+              </a:extLst>
+            </p:cNvPr>
+            <p:cNvSpPr/>
+            <p:nvPr/>
+          </p:nvSpPr>
+          <p:spPr>
+            <a:xfrm>
+              <a:off x="8124763" y="2462730"/>
+              <a:ext cx="2664000" cy="359229"/>
+            </a:xfrm>
+            <a:prstGeom prst="roundRect">
+              <a:avLst/>
+            </a:prstGeom>
+            <a:solidFill>
+              <a:schemeClr val="accent6">
+                <a:lumMod val="20000"/>
+                <a:lumOff val="80000"/>
+              </a:schemeClr>
+            </a:solidFill>
+            <a:ln>
+              <a:solidFill>
+                <a:schemeClr val="tx1"/>
+              </a:solidFill>
+            </a:ln>
+          </p:spPr>
+          <p:style>
+            <a:lnRef idx="2">
+              <a:schemeClr val="accent1">
+                <a:shade val="50000"/>
+              </a:schemeClr>
+            </a:lnRef>
+            <a:fillRef idx="1">
+              <a:schemeClr val="accent1"/>
+            </a:fillRef>
+            <a:effectRef idx="0">
+              <a:schemeClr val="accent1"/>
+            </a:effectRef>
+            <a:fontRef idx="minor">
+              <a:schemeClr val="lt1"/>
+            </a:fontRef>
+          </p:style>
+          <p:txBody>
+            <a:bodyPr rtlCol="0" anchor="ctr"/>
+            <a:lstStyle/>
+            <a:p>
+              <a:pPr algn="ctr"/>
+              <a:r>
+                <a:rPr lang="zh-CN" altLang="en-US" sz="1600" dirty="0">
+                  <a:solidFill>
+                    <a:sysClr val="windowText" lastClr="000000"/>
+                  </a:solidFill>
+                </a:rPr>
+                <a:t>性能受限于计算核心数量</a:t>
+              </a:r>
+            </a:p>
+          </p:txBody>
+        </p:sp>
+      </p:grpSp>
+      <p:sp>
+        <p:nvSpPr>
+          <p:cNvPr id="18" name="箭头: 下 17">
+            <a:extLst>
+              <a:ext uri="{FF2B5EF4-FFF2-40B4-BE49-F238E27FC236}">
+                <a16:creationId xmlns:a16="http://schemas.microsoft.com/office/drawing/2014/main" id="{554CDDE9-F1A3-40E0-B8F2-C2BF11F2CB76}"/>
+              </a:ext>
+            </a:extLst>
+          </p:cNvPr>
+          <p:cNvSpPr/>
+          <p:nvPr/>
+        </p:nvSpPr>
+        <p:spPr>
+          <a:xfrm>
+            <a:off x="3540326" y="2804944"/>
+            <a:ext cx="212834" cy="291676"/>
+          </a:xfrm>
+          <a:prstGeom prst="downArrow">
+            <a:avLst/>
+          </a:prstGeom>
+          <a:solidFill>
+            <a:schemeClr val="tx1"/>
+          </a:solidFill>
+          <a:ln>
+            <a:solidFill>
+              <a:schemeClr val="tx1"/>
+            </a:solidFill>
+          </a:ln>
+        </p:spPr>
+        <p:style>
+          <a:lnRef idx="2">
+            <a:schemeClr val="accent1">
+              <a:shade val="50000"/>
+            </a:schemeClr>
+          </a:lnRef>
+          <a:fillRef idx="1">
+            <a:schemeClr val="accent1"/>
+          </a:fillRef>
+          <a:effectRef idx="0">
+            <a:schemeClr val="accent1"/>
+          </a:effectRef>
+          <a:fontRef idx="minor">
+            <a:schemeClr val="lt1"/>
+          </a:fontRef>
+        </p:style>
+        <p:txBody>
+          <a:bodyPr rtlCol="0" anchor="ctr"/>
+          <a:lstStyle/>
+          <a:p>
+            <a:pPr algn="ctr"/>
+            <a:endParaRPr lang="zh-CN" altLang="en-US"/>
+          </a:p>
+        </p:txBody>
+      </p:sp>
+      <p:sp>
+        <p:nvSpPr>
+          <p:cNvPr id="23" name="箭头: 下 22">
+            <a:extLst>
+              <a:ext uri="{FF2B5EF4-FFF2-40B4-BE49-F238E27FC236}">
+                <a16:creationId xmlns:a16="http://schemas.microsoft.com/office/drawing/2014/main" id="{29FA4640-7E7D-45FE-95A7-0A6DAF26BFBB}"/>
+              </a:ext>
+            </a:extLst>
+          </p:cNvPr>
+          <p:cNvSpPr/>
+          <p:nvPr/>
+        </p:nvSpPr>
+        <p:spPr>
+          <a:xfrm>
+            <a:off x="6447944" y="2798438"/>
+            <a:ext cx="212834" cy="291676"/>
+          </a:xfrm>
+          <a:prstGeom prst="downArrow">
+            <a:avLst/>
+          </a:prstGeom>
+          <a:solidFill>
+            <a:schemeClr val="tx1"/>
+          </a:solidFill>
+          <a:ln>
+            <a:solidFill>
+              <a:schemeClr val="tx1"/>
+            </a:solidFill>
+          </a:ln>
+        </p:spPr>
+        <p:style>
+          <a:lnRef idx="2">
+            <a:schemeClr val="accent1">
+              <a:shade val="50000"/>
+            </a:schemeClr>
+          </a:lnRef>
+          <a:fillRef idx="1">
+            <a:schemeClr val="accent1"/>
+          </a:fillRef>
+          <a:effectRef idx="0">
+            <a:schemeClr val="accent1"/>
+          </a:effectRef>
+          <a:fontRef idx="minor">
+            <a:schemeClr val="lt1"/>
+          </a:fontRef>
+        </p:style>
+        <p:txBody>
+          <a:bodyPr rtlCol="0" anchor="ctr"/>
+          <a:lstStyle/>
+          <a:p>
+            <a:pPr algn="ctr"/>
+            <a:endParaRPr lang="zh-CN" altLang="en-US"/>
+          </a:p>
+        </p:txBody>
+      </p:sp>
+      <p:sp>
+        <p:nvSpPr>
+          <p:cNvPr id="24" name="箭头: 下 23">
+            <a:extLst>
+              <a:ext uri="{FF2B5EF4-FFF2-40B4-BE49-F238E27FC236}">
+                <a16:creationId xmlns:a16="http://schemas.microsoft.com/office/drawing/2014/main" id="{A54BE3CE-02F6-48B9-8CD1-BC83201801D6}"/>
+              </a:ext>
+            </a:extLst>
+          </p:cNvPr>
+          <p:cNvSpPr/>
+          <p:nvPr/>
+        </p:nvSpPr>
+        <p:spPr>
+          <a:xfrm>
+            <a:off x="9350346" y="2804943"/>
+            <a:ext cx="212834" cy="291676"/>
+          </a:xfrm>
+          <a:prstGeom prst="downArrow">
+            <a:avLst/>
+          </a:prstGeom>
+          <a:solidFill>
+            <a:schemeClr val="tx1"/>
+          </a:solidFill>
+          <a:ln>
+            <a:solidFill>
+              <a:schemeClr val="tx1"/>
+            </a:solidFill>
+          </a:ln>
+        </p:spPr>
+        <p:style>
+          <a:lnRef idx="2">
+            <a:schemeClr val="accent1">
+              <a:shade val="50000"/>
+            </a:schemeClr>
+          </a:lnRef>
+          <a:fillRef idx="1">
+            <a:schemeClr val="accent1"/>
+          </a:fillRef>
+          <a:effectRef idx="0">
+            <a:schemeClr val="accent1"/>
+          </a:effectRef>
+          <a:fontRef idx="minor">
+            <a:schemeClr val="lt1"/>
+          </a:fontRef>
+        </p:style>
+        <p:txBody>
+          <a:bodyPr rtlCol="0" anchor="ctr"/>
+          <a:lstStyle/>
+          <a:p>
+            <a:pPr algn="ctr"/>
+            <a:endParaRPr lang="zh-CN" altLang="en-US"/>
+          </a:p>
+        </p:txBody>
+      </p:sp>
+    </p:spTree>
+    <p:extLst>
+      <p:ext uri="{BB962C8B-B14F-4D97-AF65-F5344CB8AC3E}">
+        <p14:creationId xmlns:p14="http://schemas.microsoft.com/office/powerpoint/2010/main" val="2110121257"/>
+      </p:ext>
+    </p:extLst>
+  </p:cSld>
+  <p:clrMapOvr>
+    <a:masterClrMapping/>
+  </p:clrMapOvr>
+</p:sld>
+</file>
+
 <file path=ppt/theme/theme1.xml><?xml version="1.0" encoding="utf-8"?>
 <a:theme xmlns:a="http://schemas.openxmlformats.org/drawingml/2006/main" name="Office 主题​​">
   <a:themeElements>

</xml_diff>